<commit_message>
Laundry Mart Architecture Added
</commit_message>
<xml_diff>
--- a/documents/IOS Presentation.pptx
+++ b/documents/IOS Presentation.pptx
@@ -10,6 +10,7 @@
     <p:sldId id="258" r:id="rId4"/>
     <p:sldId id="259" r:id="rId5"/>
     <p:sldId id="260" r:id="rId6"/>
+    <p:sldId id="261" r:id="rId7"/>
   </p:sldIdLst>
   <p:sldSz cx="9144000" cy="6858000" type="screen4x3"/>
   <p:notesSz cx="6858000" cy="9144000"/>
@@ -108,6 +109,22 @@
       </a:defRPr>
     </a:lvl9pPr>
   </p:defaultTextStyle>
+  <p:extLst>
+    <p:ext uri="{EFAFB233-063F-42B5-8137-9DF3F51BA10A}">
+      <p15:sldGuideLst xmlns:p15="http://schemas.microsoft.com/office/powerpoint/2012/main">
+        <p15:guide id="1" orient="horz" pos="2160">
+          <p15:clr>
+            <a:srgbClr val="A4A3A4"/>
+          </p15:clr>
+        </p15:guide>
+        <p15:guide id="2" pos="2880">
+          <p15:clr>
+            <a:srgbClr val="A4A3A4"/>
+          </p15:clr>
+        </p15:guide>
+      </p15:sldGuideLst>
+    </p:ext>
+  </p:extLst>
 </p:presentation>
 </file>
 
@@ -450,7 +467,7 @@
           <a:p>
             <a:fld id="{563DE56F-417F-294F-9A87-02F7E6F722E2}" type="datetimeFigureOut">
               <a:rPr lang="en-US" smtClean="0"/>
-              <a:t>13/07/16</a:t>
+              <a:t>20-Jul-16</a:t>
             </a:fld>
             <a:endParaRPr lang="en-US"/>
           </a:p>
@@ -803,7 +820,7 @@
           <a:p>
             <a:fld id="{563DE56F-417F-294F-9A87-02F7E6F722E2}" type="datetimeFigureOut">
               <a:rPr lang="en-US" smtClean="0"/>
-              <a:t>13/07/16</a:t>
+              <a:t>20-Jul-16</a:t>
             </a:fld>
             <a:endParaRPr lang="en-US"/>
           </a:p>
@@ -1178,7 +1195,7 @@
           <a:p>
             <a:fld id="{563DE56F-417F-294F-9A87-02F7E6F722E2}" type="datetimeFigureOut">
               <a:rPr lang="en-US" smtClean="0"/>
-              <a:t>13/07/16</a:t>
+              <a:t>20-Jul-16</a:t>
             </a:fld>
             <a:endParaRPr lang="en-US"/>
           </a:p>
@@ -1411,7 +1428,7 @@
           <a:p>
             <a:fld id="{563DE56F-417F-294F-9A87-02F7E6F722E2}" type="datetimeFigureOut">
               <a:rPr lang="en-US" smtClean="0"/>
-              <a:t>13/07/16</a:t>
+              <a:t>20-Jul-16</a:t>
             </a:fld>
             <a:endParaRPr lang="en-US"/>
           </a:p>
@@ -1654,7 +1671,7 @@
           <a:p>
             <a:fld id="{563DE56F-417F-294F-9A87-02F7E6F722E2}" type="datetimeFigureOut">
               <a:rPr lang="en-US" smtClean="0"/>
-              <a:t>13/07/16</a:t>
+              <a:t>20-Jul-16</a:t>
             </a:fld>
             <a:endParaRPr lang="en-US"/>
           </a:p>
@@ -1887,7 +1904,7 @@
           <a:p>
             <a:fld id="{563DE56F-417F-294F-9A87-02F7E6F722E2}" type="datetimeFigureOut">
               <a:rPr lang="en-US" smtClean="0"/>
-              <a:t>13/07/16</a:t>
+              <a:t>20-Jul-16</a:t>
             </a:fld>
             <a:endParaRPr lang="en-US"/>
           </a:p>
@@ -2282,7 +2299,7 @@
           <a:p>
             <a:fld id="{563DE56F-417F-294F-9A87-02F7E6F722E2}" type="datetimeFigureOut">
               <a:rPr lang="en-US" smtClean="0"/>
-              <a:t>13/07/16</a:t>
+              <a:t>20-Jul-16</a:t>
             </a:fld>
             <a:endParaRPr lang="en-US"/>
           </a:p>
@@ -2622,7 +2639,7 @@
           <a:p>
             <a:fld id="{563DE56F-417F-294F-9A87-02F7E6F722E2}" type="datetimeFigureOut">
               <a:rPr lang="en-US" smtClean="0"/>
-              <a:t>13/07/16</a:t>
+              <a:t>20-Jul-16</a:t>
             </a:fld>
             <a:endParaRPr lang="en-US"/>
           </a:p>
@@ -3125,7 +3142,7 @@
           <a:p>
             <a:fld id="{563DE56F-417F-294F-9A87-02F7E6F722E2}" type="datetimeFigureOut">
               <a:rPr lang="en-US" smtClean="0"/>
-              <a:t>13/07/16</a:t>
+              <a:t>20-Jul-16</a:t>
             </a:fld>
             <a:endParaRPr lang="en-US"/>
           </a:p>
@@ -3634,7 +3651,7 @@
           <a:p>
             <a:fld id="{563DE56F-417F-294F-9A87-02F7E6F722E2}" type="datetimeFigureOut">
               <a:rPr lang="en-US" smtClean="0"/>
-              <a:t>13/07/16</a:t>
+              <a:t>20-Jul-16</a:t>
             </a:fld>
             <a:endParaRPr lang="en-US"/>
           </a:p>
@@ -3873,7 +3890,7 @@
           <a:p>
             <a:fld id="{563DE56F-417F-294F-9A87-02F7E6F722E2}" type="datetimeFigureOut">
               <a:rPr lang="en-US" smtClean="0"/>
-              <a:t>13/07/16</a:t>
+              <a:t>20-Jul-16</a:t>
             </a:fld>
             <a:endParaRPr lang="en-US"/>
           </a:p>
@@ -3987,7 +4004,7 @@
           <a:p>
             <a:fld id="{563DE56F-417F-294F-9A87-02F7E6F722E2}" type="datetimeFigureOut">
               <a:rPr lang="en-US" smtClean="0"/>
-              <a:t>13/07/16</a:t>
+              <a:t>20-Jul-16</a:t>
             </a:fld>
             <a:endParaRPr lang="en-US"/>
           </a:p>
@@ -4333,7 +4350,7 @@
           <a:p>
             <a:fld id="{563DE56F-417F-294F-9A87-02F7E6F722E2}" type="datetimeFigureOut">
               <a:rPr lang="en-US" smtClean="0"/>
-              <a:t>13/07/16</a:t>
+              <a:t>20-Jul-16</a:t>
             </a:fld>
             <a:endParaRPr lang="en-US"/>
           </a:p>
@@ -4566,7 +4583,7 @@
           <a:p>
             <a:fld id="{563DE56F-417F-294F-9A87-02F7E6F722E2}" type="datetimeFigureOut">
               <a:rPr lang="en-US" smtClean="0"/>
-              <a:t>13/07/16</a:t>
+              <a:t>20-Jul-16</a:t>
             </a:fld>
             <a:endParaRPr lang="en-US"/>
           </a:p>
@@ -5479,6 +5496,2711 @@
 </p:sld>
 </file>
 
+<file path=ppt/slides/slide6.xml><?xml version="1.0" encoding="utf-8"?>
+<p:sld xmlns:a="http://schemas.openxmlformats.org/drawingml/2006/main" xmlns:r="http://schemas.openxmlformats.org/officeDocument/2006/relationships" xmlns:p="http://schemas.openxmlformats.org/presentationml/2006/main">
+  <p:cSld>
+    <p:spTree>
+      <p:nvGrpSpPr>
+        <p:cNvPr id="1" name=""/>
+        <p:cNvGrpSpPr/>
+        <p:nvPr/>
+      </p:nvGrpSpPr>
+      <p:grpSpPr>
+        <a:xfrm>
+          <a:off x="0" y="0"/>
+          <a:ext cx="0" cy="0"/>
+          <a:chOff x="0" y="0"/>
+          <a:chExt cx="0" cy="0"/>
+        </a:xfrm>
+      </p:grpSpPr>
+      <p:sp>
+        <p:nvSpPr>
+          <p:cNvPr id="2" name="Title 1"/>
+          <p:cNvSpPr>
+            <a:spLocks noGrp="1"/>
+          </p:cNvSpPr>
+          <p:nvPr>
+            <p:ph type="title"/>
+          </p:nvPr>
+        </p:nvSpPr>
+        <p:spPr/>
+        <p:txBody>
+          <a:bodyPr/>
+          <a:lstStyle/>
+          <a:p>
+            <a:r>
+              <a:rPr lang="en-US" dirty="0" smtClean="0"/>
+              <a:t>Architecture</a:t>
+            </a:r>
+            <a:endParaRPr lang="en-US" dirty="0"/>
+          </a:p>
+        </p:txBody>
+      </p:sp>
+      <p:graphicFrame>
+        <p:nvGraphicFramePr>
+          <p:cNvPr id="4" name="Content Placeholder 3"/>
+          <p:cNvGraphicFramePr>
+            <a:graphicFrameLocks noGrp="1"/>
+          </p:cNvGraphicFramePr>
+          <p:nvPr>
+            <p:ph idx="1"/>
+            <p:extLst>
+              <p:ext uri="{D42A27DB-BD31-4B8C-83A1-F6EECF244321}">
+                <p14:modId xmlns:p14="http://schemas.microsoft.com/office/powerpoint/2010/main" val="3571101596"/>
+              </p:ext>
+            </p:extLst>
+          </p:nvPr>
+        </p:nvGraphicFramePr>
+        <p:xfrm>
+          <a:off x="2335060" y="5218072"/>
+          <a:ext cx="1551140" cy="594360"/>
+        </p:xfrm>
+        <a:graphic>
+          <a:graphicData uri="http://schemas.openxmlformats.org/drawingml/2006/table">
+            <a:tbl>
+              <a:tblPr>
+                <a:tableStyleId>{5C22544A-7EE6-4342-B048-85BDC9FD1C3A}</a:tableStyleId>
+              </a:tblPr>
+              <a:tblGrid>
+                <a:gridCol w="1551140"/>
+              </a:tblGrid>
+              <a:tr h="297180">
+                <a:tc>
+                  <a:txBody>
+                    <a:bodyPr/>
+                    <a:lstStyle/>
+                    <a:p>
+                      <a:pPr marL="0" marR="0" algn="just">
+                        <a:spcBef>
+                          <a:spcPts val="0"/>
+                        </a:spcBef>
+                        <a:spcAft>
+                          <a:spcPts val="0"/>
+                        </a:spcAft>
+                      </a:pPr>
+                      <a:r>
+                        <a:rPr lang="en-US" sz="1200" kern="100" dirty="0">
+                          <a:effectLst/>
+                        </a:rPr>
+                        <a:t>UI Layer</a:t>
+                      </a:r>
+                      <a:endParaRPr lang="en-US" sz="1050" kern="100" dirty="0">
+                        <a:effectLst/>
+                        <a:latin typeface="Calibri" panose="020F0502020204030204" pitchFamily="34" charset="0"/>
+                        <a:ea typeface="SimSun" panose="02010600030101010101" pitchFamily="2" charset="-122"/>
+                        <a:cs typeface="Times New Roman" panose="02020603050405020304" pitchFamily="18" charset="0"/>
+                      </a:endParaRPr>
+                    </a:p>
+                  </a:txBody>
+                  <a:tcPr marL="45720" marR="45720" marT="0" marB="0" anchor="ctr"/>
+                </a:tc>
+              </a:tr>
+              <a:tr h="297180">
+                <a:tc>
+                  <a:txBody>
+                    <a:bodyPr/>
+                    <a:lstStyle/>
+                    <a:p>
+                      <a:pPr marL="0" marR="0" algn="just">
+                        <a:spcBef>
+                          <a:spcPts val="0"/>
+                        </a:spcBef>
+                        <a:spcAft>
+                          <a:spcPts val="0"/>
+                        </a:spcAft>
+                      </a:pPr>
+                      <a:r>
+                        <a:rPr lang="en-US" sz="1200" kern="100" dirty="0">
+                          <a:effectLst/>
+                        </a:rPr>
+                        <a:t>Application Layer</a:t>
+                      </a:r>
+                      <a:endParaRPr lang="en-US" sz="1050" kern="100" dirty="0">
+                        <a:effectLst/>
+                        <a:latin typeface="Calibri" panose="020F0502020204030204" pitchFamily="34" charset="0"/>
+                        <a:ea typeface="SimSun" panose="02010600030101010101" pitchFamily="2" charset="-122"/>
+                        <a:cs typeface="Times New Roman" panose="02020603050405020304" pitchFamily="18" charset="0"/>
+                      </a:endParaRPr>
+                    </a:p>
+                  </a:txBody>
+                  <a:tcPr marL="45720" marR="45720" marT="0" marB="0" anchor="ctr"/>
+                </a:tc>
+              </a:tr>
+            </a:tbl>
+          </a:graphicData>
+        </a:graphic>
+      </p:graphicFrame>
+      <p:sp>
+        <p:nvSpPr>
+          <p:cNvPr id="5" name="Rectangle 40"/>
+          <p:cNvSpPr>
+            <a:spLocks noChangeArrowheads="1"/>
+          </p:cNvSpPr>
+          <p:nvPr/>
+        </p:nvSpPr>
+        <p:spPr bwMode="auto">
+          <a:xfrm>
+            <a:off x="904875" y="1196035"/>
+            <a:ext cx="9144000" cy="457200"/>
+          </a:xfrm>
+          <a:prstGeom prst="rect">
+            <a:avLst/>
+          </a:prstGeom>
+          <a:noFill/>
+          <a:ln>
+            <a:noFill/>
+          </a:ln>
+          <a:effectLst/>
+          <a:extLst>
+            <a:ext uri="{909E8E84-426E-40DD-AFC4-6F175D3DCCD1}">
+              <a14:hiddenFill xmlns:a14="http://schemas.microsoft.com/office/drawing/2010/main">
+                <a:solidFill>
+                  <a:schemeClr val="accent1"/>
+                </a:solidFill>
+              </a14:hiddenFill>
+            </a:ext>
+            <a:ext uri="{91240B29-F687-4F45-9708-019B960494DF}">
+              <a14:hiddenLine xmlns:a14="http://schemas.microsoft.com/office/drawing/2010/main" w="9525">
+                <a:solidFill>
+                  <a:schemeClr val="tx1"/>
+                </a:solidFill>
+                <a:miter lim="800000"/>
+                <a:headEnd/>
+                <a:tailEnd/>
+              </a14:hiddenLine>
+            </a:ext>
+            <a:ext uri="{AF507438-7753-43E0-B8FC-AC1667EBCBE1}">
+              <a14:hiddenEffects xmlns:a14="http://schemas.microsoft.com/office/drawing/2010/main">
+                <a:effectLst>
+                  <a:outerShdw dist="35921" dir="2700000" algn="ctr" rotWithShape="0">
+                    <a:schemeClr val="bg2"/>
+                  </a:outerShdw>
+                </a:effectLst>
+              </a14:hiddenEffects>
+            </a:ext>
+          </a:extLst>
+        </p:spPr>
+        <p:txBody>
+          <a:bodyPr vert="horz" wrap="none" lIns="91440" tIns="45720" rIns="91440" bIns="45720" numCol="1" anchor="ctr" anchorCtr="0" compatLnSpc="1">
+            <a:prstTxWarp prst="textNoShape">
+              <a:avLst/>
+            </a:prstTxWarp>
+            <a:spAutoFit/>
+          </a:bodyPr>
+          <a:lstStyle/>
+          <a:p>
+            <a:endParaRPr lang="en-US"/>
+          </a:p>
+        </p:txBody>
+      </p:sp>
+      <p:grpSp>
+        <p:nvGrpSpPr>
+          <p:cNvPr id="6" name="Group 5"/>
+          <p:cNvGrpSpPr/>
+          <p:nvPr/>
+        </p:nvGrpSpPr>
+        <p:grpSpPr>
+          <a:xfrm>
+            <a:off x="1743075" y="2158060"/>
+            <a:ext cx="6119813" cy="3359150"/>
+            <a:chOff x="0" y="0"/>
+            <a:chExt cx="6119495" cy="3358515"/>
+          </a:xfrm>
+        </p:grpSpPr>
+        <p:grpSp>
+          <p:nvGrpSpPr>
+            <p:cNvPr id="7" name="Page-1"/>
+            <p:cNvGrpSpPr/>
+            <p:nvPr/>
+          </p:nvGrpSpPr>
+          <p:grpSpPr>
+            <a:xfrm>
+              <a:off x="0" y="0"/>
+              <a:ext cx="6119495" cy="3358515"/>
+              <a:chOff x="42000" y="97777"/>
+              <a:chExt cx="6120000" cy="3359174"/>
+            </a:xfrm>
+          </p:grpSpPr>
+          <p:sp>
+            <p:nvSpPr>
+              <p:cNvPr id="9" name="Process 2"/>
+              <p:cNvSpPr/>
+              <p:nvPr/>
+            </p:nvSpPr>
+            <p:spPr>
+              <a:xfrm>
+                <a:off x="2741364" y="1680951"/>
+                <a:ext cx="1776000" cy="1776000"/>
+              </a:xfrm>
+              <a:custGeom>
+                <a:avLst/>
+                <a:gdLst>
+                  <a:gd name="connsiteX0" fmla="*/ 888000 w 1776000"/>
+                  <a:gd name="connsiteY0" fmla="*/ 1776000 h 1776000"/>
+                  <a:gd name="connsiteX1" fmla="*/ 888000 w 1776000"/>
+                  <a:gd name="connsiteY1" fmla="*/ 0 h 1776000"/>
+                  <a:gd name="connsiteX2" fmla="*/ 1776000 w 1776000"/>
+                  <a:gd name="connsiteY2" fmla="*/ 888000 h 1776000"/>
+                  <a:gd name="connsiteX3" fmla="*/ 0 w 1776000"/>
+                  <a:gd name="connsiteY3" fmla="*/ 888000 h 1776000"/>
+                  <a:gd name="connsiteX4" fmla="*/ 888000 w 1776000"/>
+                  <a:gd name="connsiteY4" fmla="*/ 888000 h 1776000"/>
+                  <a:gd name="connsiteX5" fmla="*/ 444000 w 1776000"/>
+                  <a:gd name="connsiteY5" fmla="*/ 0 h 1776000"/>
+                  <a:gd name="connsiteX6" fmla="*/ 1332000 w 1776000"/>
+                  <a:gd name="connsiteY6" fmla="*/ 0 h 1776000"/>
+                  <a:gd name="connsiteX7" fmla="*/ 444000 w 1776000"/>
+                  <a:gd name="connsiteY7" fmla="*/ 1776000 h 1776000"/>
+                  <a:gd name="connsiteX8" fmla="*/ 1332000 w 1776000"/>
+                  <a:gd name="connsiteY8" fmla="*/ 1776000 h 1776000"/>
+                  <a:gd name="connsiteX9" fmla="*/ 0 w 1776000"/>
+                  <a:gd name="connsiteY9" fmla="*/ 444000 h 1776000"/>
+                  <a:gd name="connsiteX10" fmla="*/ 0 w 1776000"/>
+                  <a:gd name="connsiteY10" fmla="*/ 1332000 h 1776000"/>
+                  <a:gd name="connsiteX11" fmla="*/ 1776000 w 1776000"/>
+                  <a:gd name="connsiteY11" fmla="*/ 444000 h 1776000"/>
+                  <a:gd name="connsiteX12" fmla="*/ 1776000 w 1776000"/>
+                  <a:gd name="connsiteY12" fmla="*/ 1332000 h 1776000"/>
+                </a:gdLst>
+                <a:ahLst/>
+                <a:cxnLst>
+                  <a:cxn ang="0">
+                    <a:pos x="connsiteX0" y="connsiteY0"/>
+                  </a:cxn>
+                  <a:cxn ang="0">
+                    <a:pos x="connsiteX1" y="connsiteY1"/>
+                  </a:cxn>
+                  <a:cxn ang="0">
+                    <a:pos x="connsiteX2" y="connsiteY2"/>
+                  </a:cxn>
+                  <a:cxn ang="0">
+                    <a:pos x="connsiteX3" y="connsiteY3"/>
+                  </a:cxn>
+                  <a:cxn ang="0">
+                    <a:pos x="connsiteX4" y="connsiteY4"/>
+                  </a:cxn>
+                  <a:cxn ang="0">
+                    <a:pos x="connsiteX5" y="connsiteY5"/>
+                  </a:cxn>
+                  <a:cxn ang="0">
+                    <a:pos x="connsiteX6" y="connsiteY6"/>
+                  </a:cxn>
+                  <a:cxn ang="0">
+                    <a:pos x="connsiteX7" y="connsiteY7"/>
+                  </a:cxn>
+                  <a:cxn ang="0">
+                    <a:pos x="connsiteX8" y="connsiteY8"/>
+                  </a:cxn>
+                  <a:cxn ang="0">
+                    <a:pos x="connsiteX9" y="connsiteY9"/>
+                  </a:cxn>
+                  <a:cxn ang="0">
+                    <a:pos x="connsiteX10" y="connsiteY10"/>
+                  </a:cxn>
+                  <a:cxn ang="0">
+                    <a:pos x="connsiteX11" y="connsiteY11"/>
+                  </a:cxn>
+                  <a:cxn ang="0">
+                    <a:pos x="connsiteX12" y="connsiteY12"/>
+                  </a:cxn>
+                </a:cxnLst>
+                <a:rect l="0" t="0" r="0" b="0"/>
+                <a:pathLst>
+                  <a:path w="1776000" h="1776000">
+                    <a:moveTo>
+                      <a:pt x="1633920" y="1776000"/>
+                    </a:moveTo>
+                    <a:cubicBezTo>
+                      <a:pt x="1712388" y="1776000"/>
+                      <a:pt x="1776000" y="1712388"/>
+                      <a:pt x="1776000" y="1633920"/>
+                    </a:cubicBezTo>
+                    <a:lnTo>
+                      <a:pt x="1776000" y="142080"/>
+                    </a:lnTo>
+                    <a:cubicBezTo>
+                      <a:pt x="1776000" y="63609"/>
+                      <a:pt x="1712388" y="0"/>
+                      <a:pt x="1633920" y="0"/>
+                    </a:cubicBezTo>
+                    <a:lnTo>
+                      <a:pt x="142080" y="0"/>
+                    </a:lnTo>
+                    <a:cubicBezTo>
+                      <a:pt x="63609" y="0"/>
+                      <a:pt x="0" y="63609"/>
+                      <a:pt x="0" y="142080"/>
+                    </a:cubicBezTo>
+                    <a:lnTo>
+                      <a:pt x="0" y="1633920"/>
+                    </a:lnTo>
+                    <a:cubicBezTo>
+                      <a:pt x="0" y="1712388"/>
+                      <a:pt x="63609" y="1776000"/>
+                      <a:pt x="142080" y="1776000"/>
+                    </a:cubicBezTo>
+                    <a:lnTo>
+                      <a:pt x="1633920" y="1776000"/>
+                    </a:lnTo>
+                    <a:close/>
+                  </a:path>
+                </a:pathLst>
+              </a:custGeom>
+              <a:solidFill>
+                <a:srgbClr val="CBDAB5"/>
+              </a:solidFill>
+              <a:ln w="6000" cap="flat">
+                <a:solidFill>
+                  <a:srgbClr val="FFFFFF"/>
+                </a:solidFill>
+                <a:miter lim="800000"/>
+              </a:ln>
+            </p:spPr>
+            <p:txBody>
+              <a:bodyPr/>
+              <a:lstStyle/>
+              <a:p>
+                <a:endParaRPr lang="en-US"/>
+              </a:p>
+            </p:txBody>
+          </p:sp>
+          <p:grpSp>
+            <p:nvGrpSpPr>
+              <p:cNvPr id="10" name="Server"/>
+              <p:cNvGrpSpPr/>
+              <p:nvPr/>
+            </p:nvGrpSpPr>
+            <p:grpSpPr>
+              <a:xfrm>
+                <a:off x="3247720" y="97777"/>
+                <a:ext cx="716550" cy="1302849"/>
+                <a:chOff x="3247720" y="97777"/>
+                <a:chExt cx="716550" cy="1302849"/>
+              </a:xfrm>
+            </p:grpSpPr>
+            <p:sp>
+              <p:nvSpPr>
+                <p:cNvPr id="34" name="Freeform 33"/>
+                <p:cNvSpPr/>
+                <p:nvPr/>
+              </p:nvSpPr>
+              <p:spPr>
+                <a:xfrm>
+                  <a:off x="3247768" y="98624"/>
+                  <a:ext cx="716502" cy="1080528"/>
+                </a:xfrm>
+                <a:custGeom>
+                  <a:avLst/>
+                  <a:gdLst/>
+                  <a:ahLst/>
+                  <a:cxnLst/>
+                  <a:rect l="0" t="0" r="0" b="0"/>
+                  <a:pathLst>
+                    <a:path w="716502" h="1080528">
+                      <a:moveTo>
+                        <a:pt x="695496" y="0"/>
+                      </a:moveTo>
+                      <a:lnTo>
+                        <a:pt x="0" y="1069596"/>
+                      </a:lnTo>
+                      <a:lnTo>
+                        <a:pt x="9336" y="1080528"/>
+                      </a:lnTo>
+                      <a:lnTo>
+                        <a:pt x="569468" y="1080528"/>
+                      </a:lnTo>
+                      <a:lnTo>
+                        <a:pt x="716502" y="914292"/>
+                      </a:lnTo>
+                      <a:lnTo>
+                        <a:pt x="716502" y="8749"/>
+                      </a:lnTo>
+                      <a:lnTo>
+                        <a:pt x="695496" y="0"/>
+                      </a:lnTo>
+                      <a:close/>
+                    </a:path>
+                  </a:pathLst>
+                </a:custGeom>
+                <a:solidFill>
+                  <a:srgbClr val="262626"/>
+                </a:solidFill>
+                <a:ln w="6000" cap="flat">
+                  <a:noFill/>
+                  <a:miter lim="800000"/>
+                </a:ln>
+              </p:spPr>
+              <p:txBody>
+                <a:bodyPr/>
+                <a:lstStyle/>
+                <a:p>
+                  <a:endParaRPr lang="en-US"/>
+                </a:p>
+              </p:txBody>
+            </p:sp>
+            <p:sp>
+              <p:nvSpPr>
+                <p:cNvPr id="35" name="Freeform 34"/>
+                <p:cNvSpPr/>
+                <p:nvPr/>
+              </p:nvSpPr>
+              <p:spPr>
+                <a:xfrm>
+                  <a:off x="3247720" y="245733"/>
+                  <a:ext cx="563677" cy="921600"/>
+                </a:xfrm>
+                <a:custGeom>
+                  <a:avLst/>
+                  <a:gdLst/>
+                  <a:ahLst/>
+                  <a:cxnLst/>
+                  <a:rect l="0" t="0" r="0" b="0"/>
+                  <a:pathLst>
+                    <a:path w="563677" h="921600">
+                      <a:moveTo>
+                        <a:pt x="0" y="0"/>
+                      </a:moveTo>
+                      <a:lnTo>
+                        <a:pt x="560177" y="0"/>
+                      </a:lnTo>
+                      <a:lnTo>
+                        <a:pt x="563677" y="921600"/>
+                      </a:lnTo>
+                      <a:lnTo>
+                        <a:pt x="0" y="921600"/>
+                      </a:lnTo>
+                      <a:lnTo>
+                        <a:pt x="0" y="0"/>
+                      </a:lnTo>
+                      <a:close/>
+                    </a:path>
+                  </a:pathLst>
+                </a:custGeom>
+                <a:gradFill>
+                  <a:gsLst>
+                    <a:gs pos="0">
+                      <a:srgbClr val="7F7F7F"/>
+                    </a:gs>
+                    <a:gs pos="50000">
+                      <a:srgbClr val="D8D8D8"/>
+                    </a:gs>
+                    <a:gs pos="100000">
+                      <a:srgbClr val="7F7F7F"/>
+                    </a:gs>
+                  </a:gsLst>
+                  <a:lin ang="0" scaled="0"/>
+                </a:gradFill>
+                <a:ln w="6000" cap="flat">
+                  <a:noFill/>
+                  <a:miter lim="800000"/>
+                </a:ln>
+              </p:spPr>
+              <p:txBody>
+                <a:bodyPr/>
+                <a:lstStyle/>
+                <a:p>
+                  <a:endParaRPr lang="en-US"/>
+                </a:p>
+              </p:txBody>
+            </p:sp>
+            <p:sp>
+              <p:nvSpPr>
+                <p:cNvPr id="36" name="Freeform 35"/>
+                <p:cNvSpPr/>
+                <p:nvPr/>
+              </p:nvSpPr>
+              <p:spPr>
+                <a:xfrm>
+                  <a:off x="3256848" y="97777"/>
+                  <a:ext cx="694806" cy="154791"/>
+                </a:xfrm>
+                <a:custGeom>
+                  <a:avLst/>
+                  <a:gdLst/>
+                  <a:ahLst/>
+                  <a:cxnLst/>
+                  <a:rect l="0" t="0" r="0" b="0"/>
+                  <a:pathLst>
+                    <a:path w="694806" h="154791">
+                      <a:moveTo>
+                        <a:pt x="0" y="154791"/>
+                      </a:moveTo>
+                      <a:lnTo>
+                        <a:pt x="551988" y="154791"/>
+                      </a:lnTo>
+                      <a:lnTo>
+                        <a:pt x="694806" y="0"/>
+                      </a:lnTo>
+                      <a:lnTo>
+                        <a:pt x="130703" y="0"/>
+                      </a:lnTo>
+                      <a:lnTo>
+                        <a:pt x="0" y="154791"/>
+                      </a:lnTo>
+                      <a:close/>
+                    </a:path>
+                  </a:pathLst>
+                </a:custGeom>
+                <a:solidFill>
+                  <a:srgbClr val="D8D8D8"/>
+                </a:solidFill>
+                <a:ln w="6000" cap="flat">
+                  <a:noFill/>
+                  <a:miter lim="800000"/>
+                </a:ln>
+              </p:spPr>
+              <p:txBody>
+                <a:bodyPr/>
+                <a:lstStyle/>
+                <a:p>
+                  <a:endParaRPr lang="en-US"/>
+                </a:p>
+              </p:txBody>
+            </p:sp>
+            <p:sp>
+              <p:nvSpPr>
+                <p:cNvPr id="37" name="Freeform 36"/>
+                <p:cNvSpPr/>
+                <p:nvPr/>
+              </p:nvSpPr>
+              <p:spPr>
+                <a:xfrm>
+                  <a:off x="3805550" y="97778"/>
+                  <a:ext cx="146074" cy="1072968"/>
+                </a:xfrm>
+                <a:custGeom>
+                  <a:avLst/>
+                  <a:gdLst/>
+                  <a:ahLst/>
+                  <a:cxnLst/>
+                  <a:rect l="0" t="0" r="0" b="0"/>
+                  <a:pathLst>
+                    <a:path w="146074" h="1072968">
+                      <a:moveTo>
+                        <a:pt x="3710" y="1072968"/>
+                      </a:moveTo>
+                      <a:lnTo>
+                        <a:pt x="146074" y="917142"/>
+                      </a:lnTo>
+                      <a:lnTo>
+                        <a:pt x="146074" y="0"/>
+                      </a:lnTo>
+                      <a:lnTo>
+                        <a:pt x="0" y="152861"/>
+                      </a:lnTo>
+                      <a:lnTo>
+                        <a:pt x="3710" y="1072968"/>
+                      </a:lnTo>
+                      <a:close/>
+                    </a:path>
+                  </a:pathLst>
+                </a:custGeom>
+                <a:gradFill>
+                  <a:gsLst>
+                    <a:gs pos="0">
+                      <a:srgbClr val="595959"/>
+                    </a:gs>
+                    <a:gs pos="100000">
+                      <a:srgbClr val="A5A5A5"/>
+                    </a:gs>
+                  </a:gsLst>
+                  <a:lin ang="10800000" scaled="0"/>
+                </a:gradFill>
+                <a:ln w="6000" cap="flat">
+                  <a:noFill/>
+                  <a:miter lim="800000"/>
+                </a:ln>
+              </p:spPr>
+              <p:txBody>
+                <a:bodyPr/>
+                <a:lstStyle/>
+                <a:p>
+                  <a:endParaRPr lang="en-US"/>
+                </a:p>
+              </p:txBody>
+            </p:sp>
+            <p:sp>
+              <p:nvSpPr>
+                <p:cNvPr id="38" name="Freeform 37"/>
+                <p:cNvSpPr/>
+                <p:nvPr/>
+              </p:nvSpPr>
+              <p:spPr>
+                <a:xfrm>
+                  <a:off x="3247726" y="243032"/>
+                  <a:ext cx="14463" cy="927726"/>
+                </a:xfrm>
+                <a:custGeom>
+                  <a:avLst/>
+                  <a:gdLst/>
+                  <a:ahLst/>
+                  <a:cxnLst/>
+                  <a:rect l="0" t="0" r="0" b="0"/>
+                  <a:pathLst>
+                    <a:path w="14463" h="927726">
+                      <a:moveTo>
+                        <a:pt x="0" y="6115"/>
+                      </a:moveTo>
+                      <a:lnTo>
+                        <a:pt x="0" y="927726"/>
+                      </a:lnTo>
+                      <a:lnTo>
+                        <a:pt x="14463" y="905460"/>
+                      </a:lnTo>
+                      <a:lnTo>
+                        <a:pt x="14463" y="0"/>
+                      </a:lnTo>
+                      <a:lnTo>
+                        <a:pt x="0" y="6115"/>
+                      </a:lnTo>
+                      <a:close/>
+                    </a:path>
+                  </a:pathLst>
+                </a:custGeom>
+                <a:solidFill>
+                  <a:srgbClr val="7F7F7F"/>
+                </a:solidFill>
+                <a:ln w="6000" cap="flat">
+                  <a:noFill/>
+                  <a:miter lim="800000"/>
+                </a:ln>
+              </p:spPr>
+              <p:txBody>
+                <a:bodyPr/>
+                <a:lstStyle/>
+                <a:p>
+                  <a:endParaRPr lang="en-US"/>
+                </a:p>
+              </p:txBody>
+            </p:sp>
+            <p:sp>
+              <p:nvSpPr>
+                <p:cNvPr id="39" name="Freeform 38"/>
+                <p:cNvSpPr/>
+                <p:nvPr/>
+              </p:nvSpPr>
+              <p:spPr>
+                <a:xfrm>
+                  <a:off x="3261790" y="498473"/>
+                  <a:ext cx="545226" cy="17809"/>
+                </a:xfrm>
+                <a:custGeom>
+                  <a:avLst/>
+                  <a:gdLst/>
+                  <a:ahLst/>
+                  <a:cxnLst/>
+                  <a:rect l="0" t="0" r="0" b="0"/>
+                  <a:pathLst>
+                    <a:path w="545226" h="17809">
+                      <a:moveTo>
+                        <a:pt x="0" y="0"/>
+                      </a:moveTo>
+                      <a:lnTo>
+                        <a:pt x="545226" y="0"/>
+                      </a:lnTo>
+                      <a:lnTo>
+                        <a:pt x="545226" y="17809"/>
+                      </a:lnTo>
+                      <a:lnTo>
+                        <a:pt x="0" y="17809"/>
+                      </a:lnTo>
+                      <a:lnTo>
+                        <a:pt x="0" y="0"/>
+                      </a:lnTo>
+                      <a:close/>
+                    </a:path>
+                  </a:pathLst>
+                </a:custGeom>
+                <a:gradFill>
+                  <a:gsLst>
+                    <a:gs pos="0">
+                      <a:srgbClr val="7F7F7F"/>
+                    </a:gs>
+                    <a:gs pos="50000">
+                      <a:srgbClr val="3F3F3F"/>
+                    </a:gs>
+                    <a:gs pos="100000">
+                      <a:srgbClr val="7F7F7F"/>
+                    </a:gs>
+                  </a:gsLst>
+                  <a:lin ang="0" scaled="0"/>
+                </a:gradFill>
+                <a:ln w="6000" cap="flat">
+                  <a:noFill/>
+                  <a:miter lim="800000"/>
+                </a:ln>
+              </p:spPr>
+              <p:txBody>
+                <a:bodyPr/>
+                <a:lstStyle/>
+                <a:p>
+                  <a:endParaRPr lang="en-US"/>
+                </a:p>
+              </p:txBody>
+            </p:sp>
+            <p:sp>
+              <p:nvSpPr>
+                <p:cNvPr id="40" name="Freeform 39"/>
+                <p:cNvSpPr/>
+                <p:nvPr/>
+              </p:nvSpPr>
+              <p:spPr>
+                <a:xfrm>
+                  <a:off x="3261790" y="765609"/>
+                  <a:ext cx="545226" cy="17809"/>
+                </a:xfrm>
+                <a:custGeom>
+                  <a:avLst/>
+                  <a:gdLst/>
+                  <a:ahLst/>
+                  <a:cxnLst/>
+                  <a:rect l="0" t="0" r="0" b="0"/>
+                  <a:pathLst>
+                    <a:path w="545226" h="17809">
+                      <a:moveTo>
+                        <a:pt x="0" y="0"/>
+                      </a:moveTo>
+                      <a:lnTo>
+                        <a:pt x="545226" y="0"/>
+                      </a:lnTo>
+                      <a:lnTo>
+                        <a:pt x="545226" y="17809"/>
+                      </a:lnTo>
+                      <a:lnTo>
+                        <a:pt x="0" y="17809"/>
+                      </a:lnTo>
+                      <a:lnTo>
+                        <a:pt x="0" y="0"/>
+                      </a:lnTo>
+                      <a:close/>
+                    </a:path>
+                  </a:pathLst>
+                </a:custGeom>
+                <a:gradFill>
+                  <a:gsLst>
+                    <a:gs pos="0">
+                      <a:srgbClr val="7F7F7F"/>
+                    </a:gs>
+                    <a:gs pos="50000">
+                      <a:srgbClr val="3F3F3F"/>
+                    </a:gs>
+                    <a:gs pos="100000">
+                      <a:srgbClr val="7F7F7F"/>
+                    </a:gs>
+                  </a:gsLst>
+                  <a:lin ang="0" scaled="0"/>
+                </a:gradFill>
+                <a:ln w="6000" cap="flat">
+                  <a:noFill/>
+                  <a:miter lim="800000"/>
+                </a:ln>
+              </p:spPr>
+              <p:txBody>
+                <a:bodyPr/>
+                <a:lstStyle/>
+                <a:p>
+                  <a:endParaRPr lang="en-US"/>
+                </a:p>
+              </p:txBody>
+            </p:sp>
+            <p:sp>
+              <p:nvSpPr>
+                <p:cNvPr id="41" name="Freeform 40"/>
+                <p:cNvSpPr/>
+                <p:nvPr/>
+              </p:nvSpPr>
+              <p:spPr>
+                <a:xfrm>
+                  <a:off x="3633415" y="1014932"/>
+                  <a:ext cx="106070" cy="75687"/>
+                </a:xfrm>
+                <a:custGeom>
+                  <a:avLst/>
+                  <a:gdLst/>
+                  <a:ahLst/>
+                  <a:cxnLst/>
+                  <a:rect l="0" t="0" r="0" b="0"/>
+                  <a:pathLst>
+                    <a:path w="106070" h="75687">
+                      <a:moveTo>
+                        <a:pt x="0" y="0"/>
+                      </a:moveTo>
+                      <a:lnTo>
+                        <a:pt x="106070" y="0"/>
+                      </a:lnTo>
+                      <a:lnTo>
+                        <a:pt x="106070" y="75687"/>
+                      </a:lnTo>
+                      <a:lnTo>
+                        <a:pt x="0" y="75687"/>
+                      </a:lnTo>
+                      <a:lnTo>
+                        <a:pt x="0" y="0"/>
+                      </a:lnTo>
+                      <a:close/>
+                    </a:path>
+                  </a:pathLst>
+                </a:custGeom>
+                <a:gradFill>
+                  <a:gsLst>
+                    <a:gs pos="0">
+                      <a:srgbClr val="FF0000"/>
+                    </a:gs>
+                    <a:gs pos="100000">
+                      <a:srgbClr val="FF5050"/>
+                    </a:gs>
+                  </a:gsLst>
+                  <a:lin ang="18900000" scaled="0"/>
+                </a:gradFill>
+                <a:ln w="6000" cap="flat">
+                  <a:noFill/>
+                  <a:miter lim="800000"/>
+                </a:ln>
+              </p:spPr>
+              <p:txBody>
+                <a:bodyPr/>
+                <a:lstStyle/>
+                <a:p>
+                  <a:endParaRPr lang="en-US"/>
+                </a:p>
+              </p:txBody>
+            </p:sp>
+            <p:sp>
+              <p:nvSpPr>
+                <p:cNvPr id="42" name="Freeform 41"/>
+                <p:cNvSpPr/>
+                <p:nvPr/>
+              </p:nvSpPr>
+              <p:spPr>
+                <a:xfrm>
+                  <a:off x="3247720" y="97781"/>
+                  <a:ext cx="703926" cy="151766"/>
+                </a:xfrm>
+                <a:custGeom>
+                  <a:avLst/>
+                  <a:gdLst/>
+                  <a:ahLst/>
+                  <a:cxnLst/>
+                  <a:rect l="0" t="0" r="0" b="0"/>
+                  <a:pathLst>
+                    <a:path w="703926" h="151766">
+                      <a:moveTo>
+                        <a:pt x="703926" y="0"/>
+                      </a:moveTo>
+                      <a:lnTo>
+                        <a:pt x="687822" y="8224"/>
+                      </a:lnTo>
+                      <a:lnTo>
+                        <a:pt x="148105" y="11642"/>
+                      </a:lnTo>
+                      <a:lnTo>
+                        <a:pt x="13177" y="151766"/>
+                      </a:lnTo>
+                      <a:lnTo>
+                        <a:pt x="0" y="151372"/>
+                      </a:lnTo>
+                      <a:lnTo>
+                        <a:pt x="139821" y="0"/>
+                      </a:lnTo>
+                      <a:lnTo>
+                        <a:pt x="703926" y="0"/>
+                      </a:lnTo>
+                      <a:close/>
+                    </a:path>
+                  </a:pathLst>
+                </a:custGeom>
+                <a:solidFill>
+                  <a:srgbClr val="7F7F7F"/>
+                </a:solidFill>
+                <a:ln w="6000" cap="flat">
+                  <a:noFill/>
+                  <a:miter lim="800000"/>
+                </a:ln>
+              </p:spPr>
+              <p:txBody>
+                <a:bodyPr/>
+                <a:lstStyle/>
+                <a:p>
+                  <a:endParaRPr lang="en-US"/>
+                </a:p>
+              </p:txBody>
+            </p:sp>
+            <p:sp>
+              <p:nvSpPr>
+                <p:cNvPr id="43" name="Freeform 42"/>
+                <p:cNvSpPr/>
+                <p:nvPr/>
+              </p:nvSpPr>
+              <p:spPr>
+                <a:xfrm>
+                  <a:off x="3262186" y="246133"/>
+                  <a:ext cx="544816" cy="559546"/>
+                </a:xfrm>
+                <a:custGeom>
+                  <a:avLst/>
+                  <a:gdLst/>
+                  <a:ahLst/>
+                  <a:cxnLst/>
+                  <a:rect l="0" t="0" r="0" b="0"/>
+                  <a:pathLst>
+                    <a:path w="544816" h="559546">
+                      <a:moveTo>
+                        <a:pt x="0" y="537286"/>
+                      </a:moveTo>
+                      <a:lnTo>
+                        <a:pt x="544816" y="537286"/>
+                      </a:lnTo>
+                      <a:lnTo>
+                        <a:pt x="544816" y="559546"/>
+                      </a:lnTo>
+                      <a:lnTo>
+                        <a:pt x="0" y="559546"/>
+                      </a:lnTo>
+                      <a:lnTo>
+                        <a:pt x="0" y="537286"/>
+                      </a:lnTo>
+                      <a:close/>
+                    </a:path>
+                    <a:path w="544816" h="559546">
+                      <a:moveTo>
+                        <a:pt x="0" y="270155"/>
+                      </a:moveTo>
+                      <a:lnTo>
+                        <a:pt x="544816" y="270155"/>
+                      </a:lnTo>
+                      <a:lnTo>
+                        <a:pt x="544816" y="292416"/>
+                      </a:lnTo>
+                      <a:lnTo>
+                        <a:pt x="0" y="292416"/>
+                      </a:lnTo>
+                      <a:lnTo>
+                        <a:pt x="0" y="270155"/>
+                      </a:lnTo>
+                      <a:close/>
+                    </a:path>
+                    <a:path w="544816" h="559546">
+                      <a:moveTo>
+                        <a:pt x="2360" y="0"/>
+                      </a:moveTo>
+                      <a:lnTo>
+                        <a:pt x="544816" y="3024"/>
+                      </a:lnTo>
+                      <a:lnTo>
+                        <a:pt x="530350" y="20833"/>
+                      </a:lnTo>
+                      <a:lnTo>
+                        <a:pt x="1946" y="20833"/>
+                      </a:lnTo>
+                      <a:lnTo>
+                        <a:pt x="2360" y="0"/>
+                      </a:lnTo>
+                      <a:close/>
+                    </a:path>
+                  </a:pathLst>
+                </a:custGeom>
+                <a:gradFill>
+                  <a:gsLst>
+                    <a:gs pos="0">
+                      <a:srgbClr val="BFBFBF"/>
+                    </a:gs>
+                    <a:gs pos="50000">
+                      <a:srgbClr val="F2F2F2"/>
+                    </a:gs>
+                    <a:gs pos="100000">
+                      <a:srgbClr val="BFBFBF"/>
+                    </a:gs>
+                  </a:gsLst>
+                  <a:lin ang="0" scaled="0"/>
+                </a:gradFill>
+                <a:ln w="6000" cap="flat">
+                  <a:noFill/>
+                  <a:miter lim="800000"/>
+                </a:ln>
+              </p:spPr>
+              <p:txBody>
+                <a:bodyPr/>
+                <a:lstStyle/>
+                <a:p>
+                  <a:endParaRPr lang="en-US"/>
+                </a:p>
+              </p:txBody>
+            </p:sp>
+            <p:sp>
+              <p:nvSpPr>
+                <p:cNvPr id="44" name="Text 160"/>
+                <p:cNvSpPr txBox="1"/>
+                <p:nvPr/>
+              </p:nvSpPr>
+              <p:spPr>
+                <a:xfrm>
+                  <a:off x="3403943" y="1280626"/>
+                  <a:ext cx="480000" cy="120000"/>
+                </a:xfrm>
+                <a:prstGeom prst="rect">
+                  <a:avLst/>
+                </a:prstGeom>
+                <a:noFill/>
+              </p:spPr>
+              <p:txBody>
+                <a:bodyPr wrap="square" lIns="36000" tIns="0" rIns="36000" bIns="0" rtlCol="0" anchor="ctr"/>
+                <a:lstStyle/>
+                <a:p>
+                  <a:pPr marL="0" marR="0" algn="ctr">
+                    <a:spcBef>
+                      <a:spcPts val="0"/>
+                    </a:spcBef>
+                    <a:spcAft>
+                      <a:spcPts val="0"/>
+                    </a:spcAft>
+                  </a:pPr>
+                  <a:r>
+                    <a:rPr lang="en-US" sz="850" kern="100">
+                      <a:solidFill>
+                        <a:srgbClr val="303030"/>
+                      </a:solidFill>
+                      <a:effectLst/>
+                      <a:latin typeface="Arial" panose="020B0604020202020204" pitchFamily="34" charset="0"/>
+                      <a:ea typeface="SimSun" panose="02010600030101010101" pitchFamily="2" charset="-122"/>
+                      <a:cs typeface="Times New Roman" panose="02020603050405020304" pitchFamily="18" charset="0"/>
+                    </a:rPr>
+                    <a:t>Server</a:t>
+                  </a:r>
+                  <a:endParaRPr lang="en-US" sz="1050" kern="100">
+                    <a:effectLst/>
+                    <a:latin typeface="Calibri" panose="020F0502020204030204" pitchFamily="34" charset="0"/>
+                    <a:ea typeface="SimSun" panose="02010600030101010101" pitchFamily="2" charset="-122"/>
+                    <a:cs typeface="Times New Roman" panose="02020603050405020304" pitchFamily="18" charset="0"/>
+                  </a:endParaRPr>
+                </a:p>
+              </p:txBody>
+            </p:sp>
+          </p:grpSp>
+          <p:grpSp>
+            <p:nvGrpSpPr>
+              <p:cNvPr id="11" name="Database"/>
+              <p:cNvGrpSpPr/>
+              <p:nvPr/>
+            </p:nvGrpSpPr>
+            <p:grpSpPr>
+              <a:xfrm>
+                <a:off x="3357972" y="2126628"/>
+                <a:ext cx="542785" cy="884646"/>
+                <a:chOff x="3357972" y="2126628"/>
+                <a:chExt cx="542785" cy="884646"/>
+              </a:xfrm>
+            </p:grpSpPr>
+            <p:sp>
+              <p:nvSpPr>
+                <p:cNvPr id="26" name="Freeform 25"/>
+                <p:cNvSpPr/>
+                <p:nvPr/>
+              </p:nvSpPr>
+              <p:spPr>
+                <a:xfrm>
+                  <a:off x="3355988" y="2126004"/>
+                  <a:ext cx="545596" cy="885684"/>
+                </a:xfrm>
+                <a:custGeom>
+                  <a:avLst/>
+                  <a:gdLst/>
+                  <a:ahLst/>
+                  <a:cxnLst/>
+                  <a:rect l="0" t="0" r="0" b="0"/>
+                  <a:pathLst>
+                    <a:path w="545596" h="885684">
+                      <a:moveTo>
+                        <a:pt x="995" y="124864"/>
+                      </a:moveTo>
+                      <a:cubicBezTo>
+                        <a:pt x="2575" y="-41711"/>
+                        <a:pt x="538738" y="-41711"/>
+                        <a:pt x="543274" y="123818"/>
+                      </a:cubicBezTo>
+                      <a:cubicBezTo>
+                        <a:pt x="548073" y="299021"/>
+                        <a:pt x="543274" y="585328"/>
+                        <a:pt x="543274" y="754908"/>
+                      </a:cubicBezTo>
+                      <a:cubicBezTo>
+                        <a:pt x="543274" y="924492"/>
+                        <a:pt x="2098" y="934746"/>
+                        <a:pt x="2098" y="753600"/>
+                      </a:cubicBezTo>
+                      <a:cubicBezTo>
+                        <a:pt x="2098" y="572461"/>
+                        <a:pt x="0" y="284109"/>
+                        <a:pt x="995" y="124864"/>
+                      </a:cubicBezTo>
+                      <a:close/>
+                    </a:path>
+                  </a:pathLst>
+                </a:custGeom>
+                <a:gradFill>
+                  <a:gsLst>
+                    <a:gs pos="0">
+                      <a:srgbClr val="E49225"/>
+                    </a:gs>
+                    <a:gs pos="100000">
+                      <a:srgbClr val="CC6600"/>
+                    </a:gs>
+                  </a:gsLst>
+                  <a:lin ang="5400000" scaled="0"/>
+                </a:gradFill>
+                <a:ln w="6000" cap="flat">
+                  <a:noFill/>
+                  <a:miter lim="800000"/>
+                </a:ln>
+              </p:spPr>
+              <p:txBody>
+                <a:bodyPr/>
+                <a:lstStyle/>
+                <a:p>
+                  <a:endParaRPr lang="en-US"/>
+                </a:p>
+              </p:txBody>
+            </p:sp>
+            <p:sp>
+              <p:nvSpPr>
+                <p:cNvPr id="27" name="Freeform 26"/>
+                <p:cNvSpPr/>
+                <p:nvPr/>
+              </p:nvSpPr>
+              <p:spPr>
+                <a:xfrm>
+                  <a:off x="3368554" y="2140279"/>
+                  <a:ext cx="518046" cy="854562"/>
+                </a:xfrm>
+                <a:custGeom>
+                  <a:avLst/>
+                  <a:gdLst/>
+                  <a:ahLst/>
+                  <a:cxnLst/>
+                  <a:rect l="0" t="0" r="0" b="0"/>
+                  <a:pathLst>
+                    <a:path w="518046" h="854562">
+                      <a:moveTo>
+                        <a:pt x="3481" y="119144"/>
+                      </a:moveTo>
+                      <a:cubicBezTo>
+                        <a:pt x="-6017" y="284802"/>
+                        <a:pt x="16089" y="655476"/>
+                        <a:pt x="3050" y="719184"/>
+                      </a:cubicBezTo>
+                      <a:cubicBezTo>
+                        <a:pt x="-9989" y="782886"/>
+                        <a:pt x="57040" y="813906"/>
+                        <a:pt x="57040" y="813906"/>
+                      </a:cubicBezTo>
+                      <a:cubicBezTo>
+                        <a:pt x="57040" y="813906"/>
+                        <a:pt x="319653" y="906468"/>
+                        <a:pt x="463801" y="813906"/>
+                      </a:cubicBezTo>
+                      <a:cubicBezTo>
+                        <a:pt x="494402" y="794118"/>
+                        <a:pt x="515439" y="794040"/>
+                        <a:pt x="515438" y="719184"/>
+                      </a:cubicBezTo>
+                      <a:cubicBezTo>
+                        <a:pt x="515438" y="644322"/>
+                        <a:pt x="519289" y="271811"/>
+                        <a:pt x="518046" y="119144"/>
+                      </a:cubicBezTo>
+                      <a:cubicBezTo>
+                        <a:pt x="515389" y="-33522"/>
+                        <a:pt x="12979" y="-46513"/>
+                        <a:pt x="3481" y="119144"/>
+                      </a:cubicBezTo>
+                      <a:close/>
+                    </a:path>
+                  </a:pathLst>
+                </a:custGeom>
+                <a:gradFill>
+                  <a:gsLst>
+                    <a:gs pos="0">
+                      <a:srgbClr val="FED83D"/>
+                    </a:gs>
+                    <a:gs pos="100000">
+                      <a:srgbClr val="E2A71C"/>
+                    </a:gs>
+                  </a:gsLst>
+                  <a:lin ang="18900000" scaled="0"/>
+                </a:gradFill>
+                <a:ln w="6000" cap="flat">
+                  <a:noFill/>
+                  <a:miter lim="800000"/>
+                </a:ln>
+              </p:spPr>
+              <p:txBody>
+                <a:bodyPr/>
+                <a:lstStyle/>
+                <a:p>
+                  <a:endParaRPr lang="en-US"/>
+                </a:p>
+              </p:txBody>
+            </p:sp>
+            <p:sp>
+              <p:nvSpPr>
+                <p:cNvPr id="28" name="Freeform 27"/>
+                <p:cNvSpPr/>
+                <p:nvPr/>
+              </p:nvSpPr>
+              <p:spPr>
+                <a:xfrm>
+                  <a:off x="3422841" y="2327989"/>
+                  <a:ext cx="37522" cy="640512"/>
+                </a:xfrm>
+                <a:custGeom>
+                  <a:avLst/>
+                  <a:gdLst/>
+                  <a:ahLst/>
+                  <a:cxnLst/>
+                  <a:rect l="0" t="0" r="0" b="0"/>
+                  <a:pathLst>
+                    <a:path w="37522" h="640512">
+                      <a:moveTo>
+                        <a:pt x="0" y="0"/>
+                      </a:moveTo>
+                      <a:lnTo>
+                        <a:pt x="0" y="624786"/>
+                      </a:lnTo>
+                      <a:lnTo>
+                        <a:pt x="36917" y="640512"/>
+                      </a:lnTo>
+                      <a:lnTo>
+                        <a:pt x="37522" y="0"/>
+                      </a:lnTo>
+                      <a:lnTo>
+                        <a:pt x="0" y="0"/>
+                      </a:lnTo>
+                      <a:close/>
+                    </a:path>
+                  </a:pathLst>
+                </a:custGeom>
+                <a:solidFill>
+                  <a:srgbClr val="F2F2F2"/>
+                </a:solidFill>
+                <a:ln w="6000" cap="flat">
+                  <a:noFill/>
+                  <a:miter lim="800000"/>
+                </a:ln>
+              </p:spPr>
+              <p:txBody>
+                <a:bodyPr/>
+                <a:lstStyle/>
+                <a:p>
+                  <a:endParaRPr lang="en-US"/>
+                </a:p>
+              </p:txBody>
+            </p:sp>
+            <p:sp>
+              <p:nvSpPr>
+                <p:cNvPr id="29" name="Freeform 28"/>
+                <p:cNvSpPr/>
+                <p:nvPr/>
+              </p:nvSpPr>
+              <p:spPr>
+                <a:xfrm>
+                  <a:off x="3765385" y="2328030"/>
+                  <a:ext cx="67517" cy="651624"/>
+                </a:xfrm>
+                <a:custGeom>
+                  <a:avLst/>
+                  <a:gdLst/>
+                  <a:ahLst/>
+                  <a:cxnLst/>
+                  <a:rect l="0" t="0" r="0" b="0"/>
+                  <a:pathLst>
+                    <a:path w="67517" h="651624">
+                      <a:moveTo>
+                        <a:pt x="0" y="33387"/>
+                      </a:moveTo>
+                      <a:lnTo>
+                        <a:pt x="337" y="651624"/>
+                      </a:lnTo>
+                      <a:lnTo>
+                        <a:pt x="67358" y="625296"/>
+                      </a:lnTo>
+                      <a:lnTo>
+                        <a:pt x="67358" y="0"/>
+                      </a:lnTo>
+                      <a:lnTo>
+                        <a:pt x="0" y="33387"/>
+                      </a:lnTo>
+                      <a:close/>
+                    </a:path>
+                  </a:pathLst>
+                </a:custGeom>
+                <a:gradFill>
+                  <a:gsLst>
+                    <a:gs pos="0">
+                      <a:srgbClr val="E49225"/>
+                    </a:gs>
+                    <a:gs pos="100000">
+                      <a:srgbClr val="E2A71C"/>
+                    </a:gs>
+                  </a:gsLst>
+                  <a:lin ang="5400000" scaled="0"/>
+                </a:gradFill>
+                <a:ln w="6000" cap="flat">
+                  <a:noFill/>
+                  <a:miter lim="800000"/>
+                </a:ln>
+              </p:spPr>
+              <p:txBody>
+                <a:bodyPr/>
+                <a:lstStyle/>
+                <a:p>
+                  <a:endParaRPr lang="en-US"/>
+                </a:p>
+              </p:txBody>
+            </p:sp>
+            <p:sp>
+              <p:nvSpPr>
+                <p:cNvPr id="30" name="Freeform 29"/>
+                <p:cNvSpPr/>
+                <p:nvPr/>
+              </p:nvSpPr>
+              <p:spPr>
+                <a:xfrm>
+                  <a:off x="3371609" y="2141770"/>
+                  <a:ext cx="512335" cy="227975"/>
+                </a:xfrm>
+                <a:custGeom>
+                  <a:avLst/>
+                  <a:gdLst/>
+                  <a:ahLst/>
+                  <a:cxnLst/>
+                  <a:rect l="0" t="0" r="0" b="0"/>
+                  <a:pathLst>
+                    <a:path w="512335" h="227975">
+                      <a:moveTo>
+                        <a:pt x="0" y="113766"/>
+                      </a:moveTo>
+                      <a:cubicBezTo>
+                        <a:pt x="-13043" y="-23775"/>
+                        <a:pt x="509573" y="-53784"/>
+                        <a:pt x="512335" y="113766"/>
+                      </a:cubicBezTo>
+                      <a:cubicBezTo>
+                        <a:pt x="515179" y="279568"/>
+                        <a:pt x="13043" y="251306"/>
+                        <a:pt x="0" y="113766"/>
+                      </a:cubicBezTo>
+                      <a:close/>
+                    </a:path>
+                  </a:pathLst>
+                </a:custGeom>
+                <a:gradFill>
+                  <a:gsLst>
+                    <a:gs pos="0">
+                      <a:srgbClr val="FED83D"/>
+                    </a:gs>
+                    <a:gs pos="100000">
+                      <a:srgbClr val="E2A71C"/>
+                    </a:gs>
+                  </a:gsLst>
+                  <a:lin ang="16200000" scaled="0"/>
+                </a:gradFill>
+                <a:ln w="6000" cap="flat">
+                  <a:noFill/>
+                  <a:miter lim="800000"/>
+                </a:ln>
+              </p:spPr>
+              <p:txBody>
+                <a:bodyPr/>
+                <a:lstStyle/>
+                <a:p>
+                  <a:endParaRPr lang="en-US"/>
+                </a:p>
+              </p:txBody>
+            </p:sp>
+            <p:sp>
+              <p:nvSpPr>
+                <p:cNvPr id="31" name="Freeform 30"/>
+                <p:cNvSpPr/>
+                <p:nvPr/>
+              </p:nvSpPr>
+              <p:spPr>
+                <a:xfrm>
+                  <a:off x="3385077" y="2296520"/>
+                  <a:ext cx="409073" cy="73495"/>
+                </a:xfrm>
+                <a:custGeom>
+                  <a:avLst/>
+                  <a:gdLst/>
+                  <a:ahLst/>
+                  <a:cxnLst/>
+                  <a:rect l="0" t="0" r="0" b="0"/>
+                  <a:pathLst>
+                    <a:path w="409073" h="73495">
+                      <a:moveTo>
+                        <a:pt x="0" y="1406"/>
+                      </a:moveTo>
+                      <a:cubicBezTo>
+                        <a:pt x="0" y="1406"/>
+                        <a:pt x="172068" y="79879"/>
+                        <a:pt x="410186" y="48805"/>
+                      </a:cubicBezTo>
+                      <a:cubicBezTo>
+                        <a:pt x="148238" y="124817"/>
+                        <a:pt x="0" y="1406"/>
+                        <a:pt x="0" y="1406"/>
+                      </a:cubicBezTo>
+                      <a:close/>
+                    </a:path>
+                  </a:pathLst>
+                </a:custGeom>
+                <a:solidFill>
+                  <a:srgbClr val="F2F2F2"/>
+                </a:solidFill>
+                <a:ln w="6000" cap="flat">
+                  <a:noFill/>
+                  <a:miter lim="800000"/>
+                </a:ln>
+              </p:spPr>
+              <p:txBody>
+                <a:bodyPr/>
+                <a:lstStyle/>
+                <a:p>
+                  <a:endParaRPr lang="en-US"/>
+                </a:p>
+              </p:txBody>
+            </p:sp>
+            <p:sp>
+              <p:nvSpPr>
+                <p:cNvPr id="32" name="Freeform 31"/>
+                <p:cNvSpPr/>
+                <p:nvPr/>
+              </p:nvSpPr>
+              <p:spPr>
+                <a:xfrm>
+                  <a:off x="3469565" y="2550514"/>
+                  <a:ext cx="246238" cy="449633"/>
+                </a:xfrm>
+                <a:custGeom>
+                  <a:avLst/>
+                  <a:gdLst/>
+                  <a:ahLst/>
+                  <a:cxnLst/>
+                  <a:rect l="0" t="0" r="0" b="0"/>
+                  <a:pathLst>
+                    <a:path w="246238" h="449633">
+                      <a:moveTo>
+                        <a:pt x="13686" y="0"/>
+                      </a:moveTo>
+                      <a:cubicBezTo>
+                        <a:pt x="13686" y="0"/>
+                        <a:pt x="99492" y="350190"/>
+                        <a:pt x="244894" y="443725"/>
+                      </a:cubicBezTo>
+                      <a:cubicBezTo>
+                        <a:pt x="111406" y="466283"/>
+                        <a:pt x="0" y="424304"/>
+                        <a:pt x="0" y="424304"/>
+                      </a:cubicBezTo>
+                      <a:lnTo>
+                        <a:pt x="13686" y="0"/>
+                      </a:lnTo>
+                      <a:close/>
+                    </a:path>
+                  </a:pathLst>
+                </a:custGeom>
+                <a:gradFill>
+                  <a:gsLst>
+                    <a:gs pos="0">
+                      <a:srgbClr val="E49225"/>
+                    </a:gs>
+                    <a:gs pos="100000">
+                      <a:srgbClr val="E2A71C"/>
+                    </a:gs>
+                  </a:gsLst>
+                  <a:lin ang="16200000" scaled="0"/>
+                </a:gradFill>
+                <a:ln w="6000" cap="flat">
+                  <a:noFill/>
+                  <a:miter lim="800000"/>
+                </a:ln>
+              </p:spPr>
+              <p:txBody>
+                <a:bodyPr/>
+                <a:lstStyle/>
+                <a:p>
+                  <a:endParaRPr lang="en-US"/>
+                </a:p>
+              </p:txBody>
+            </p:sp>
+            <p:sp>
+              <p:nvSpPr>
+                <p:cNvPr id="33" name="Text 161"/>
+                <p:cNvSpPr txBox="1"/>
+                <p:nvPr/>
+              </p:nvSpPr>
+              <p:spPr>
+                <a:xfrm>
+                  <a:off x="3231964" y="3042148"/>
+                  <a:ext cx="794802" cy="203642"/>
+                </a:xfrm>
+                <a:prstGeom prst="rect">
+                  <a:avLst/>
+                </a:prstGeom>
+                <a:noFill/>
+              </p:spPr>
+              <p:txBody>
+                <a:bodyPr wrap="square" lIns="36000" tIns="0" rIns="36000" bIns="0" rtlCol="0" anchor="ctr"/>
+                <a:lstStyle/>
+                <a:p>
+                  <a:pPr marL="0" marR="0" algn="ctr">
+                    <a:spcBef>
+                      <a:spcPts val="0"/>
+                    </a:spcBef>
+                    <a:spcAft>
+                      <a:spcPts val="0"/>
+                    </a:spcAft>
+                  </a:pPr>
+                  <a:r>
+                    <a:rPr lang="en-US" sz="850" kern="100">
+                      <a:solidFill>
+                        <a:srgbClr val="303030"/>
+                      </a:solidFill>
+                      <a:effectLst/>
+                      <a:latin typeface="Arial" panose="020B0604020202020204" pitchFamily="34" charset="0"/>
+                      <a:ea typeface="SimSun" panose="02010600030101010101" pitchFamily="2" charset="-122"/>
+                      <a:cs typeface="Times New Roman" panose="02020603050405020304" pitchFamily="18" charset="0"/>
+                    </a:rPr>
+                    <a:t>Database</a:t>
+                  </a:r>
+                  <a:endParaRPr lang="en-US" sz="1050" kern="100">
+                    <a:effectLst/>
+                    <a:latin typeface="Calibri" panose="020F0502020204030204" pitchFamily="34" charset="0"/>
+                    <a:ea typeface="SimSun" panose="02010600030101010101" pitchFamily="2" charset="-122"/>
+                    <a:cs typeface="Times New Roman" panose="02020603050405020304" pitchFamily="18" charset="0"/>
+                  </a:endParaRPr>
+                </a:p>
+              </p:txBody>
+            </p:sp>
+          </p:grpSp>
+          <p:grpSp>
+            <p:nvGrpSpPr>
+              <p:cNvPr id="12" name="User"/>
+              <p:cNvGrpSpPr/>
+              <p:nvPr/>
+            </p:nvGrpSpPr>
+            <p:grpSpPr>
+              <a:xfrm flipH="1">
+                <a:off x="42000" y="578625"/>
+                <a:ext cx="420000" cy="600000"/>
+                <a:chOff x="42000" y="578625"/>
+                <a:chExt cx="420000" cy="600000"/>
+              </a:xfrm>
+            </p:grpSpPr>
+            <p:sp>
+              <p:nvSpPr>
+                <p:cNvPr id="20" name="Freeform 19"/>
+                <p:cNvSpPr/>
+                <p:nvPr/>
+              </p:nvSpPr>
+              <p:spPr>
+                <a:xfrm flipH="1">
+                  <a:off x="57074" y="664765"/>
+                  <a:ext cx="346612" cy="456958"/>
+                </a:xfrm>
+                <a:custGeom>
+                  <a:avLst/>
+                  <a:gdLst/>
+                  <a:ahLst/>
+                  <a:cxnLst/>
+                  <a:rect l="0" t="0" r="0" b="0"/>
+                  <a:pathLst>
+                    <a:path w="346612" h="456958">
+                      <a:moveTo>
+                        <a:pt x="301290" y="23959"/>
+                      </a:moveTo>
+                      <a:cubicBezTo>
+                        <a:pt x="301290" y="23959"/>
+                        <a:pt x="317028" y="52553"/>
+                        <a:pt x="321005" y="64418"/>
+                      </a:cubicBezTo>
+                      <a:cubicBezTo>
+                        <a:pt x="327577" y="84023"/>
+                        <a:pt x="331524" y="109523"/>
+                        <a:pt x="328399" y="120781"/>
+                      </a:cubicBezTo>
+                      <a:cubicBezTo>
+                        <a:pt x="324098" y="129620"/>
+                        <a:pt x="311376" y="147893"/>
+                        <a:pt x="311147" y="156724"/>
+                      </a:cubicBezTo>
+                      <a:cubicBezTo>
+                        <a:pt x="310782" y="170880"/>
+                        <a:pt x="348490" y="213251"/>
+                        <a:pt x="346126" y="227791"/>
+                      </a:cubicBezTo>
+                      <a:cubicBezTo>
+                        <a:pt x="344829" y="245762"/>
+                        <a:pt x="323887" y="236572"/>
+                        <a:pt x="318956" y="250663"/>
+                      </a:cubicBezTo>
+                      <a:cubicBezTo>
+                        <a:pt x="316720" y="257062"/>
+                        <a:pt x="317102" y="274349"/>
+                        <a:pt x="316244" y="277197"/>
+                      </a:cubicBezTo>
+                      <a:cubicBezTo>
+                        <a:pt x="314434" y="284155"/>
+                        <a:pt x="298278" y="294497"/>
+                        <a:pt x="276371" y="295586"/>
+                      </a:cubicBezTo>
+                      <a:cubicBezTo>
+                        <a:pt x="310327" y="297764"/>
+                        <a:pt x="313242" y="280891"/>
+                        <a:pt x="315260" y="289459"/>
+                      </a:cubicBezTo>
+                      <a:cubicBezTo>
+                        <a:pt x="315090" y="296820"/>
+                        <a:pt x="311563" y="298730"/>
+                        <a:pt x="311563" y="305393"/>
+                      </a:cubicBezTo>
+                      <a:cubicBezTo>
+                        <a:pt x="311563" y="313540"/>
+                        <a:pt x="317964" y="321530"/>
+                        <a:pt x="309715" y="340309"/>
+                      </a:cubicBezTo>
+                      <a:cubicBezTo>
+                        <a:pt x="285070" y="364815"/>
+                        <a:pt x="233724" y="346244"/>
+                        <a:pt x="227154" y="353174"/>
+                      </a:cubicBezTo>
+                      <a:cubicBezTo>
+                        <a:pt x="220585" y="360106"/>
+                        <a:pt x="234871" y="407371"/>
+                        <a:pt x="234871" y="407371"/>
+                      </a:cubicBezTo>
+                      <a:lnTo>
+                        <a:pt x="219055" y="456011"/>
+                      </a:lnTo>
+                      <a:lnTo>
+                        <a:pt x="32214" y="404123"/>
+                      </a:lnTo>
+                      <a:lnTo>
+                        <a:pt x="40003" y="347326"/>
+                      </a:lnTo>
+                      <a:lnTo>
+                        <a:pt x="0" y="148280"/>
+                      </a:lnTo>
+                      <a:lnTo>
+                        <a:pt x="281848" y="0"/>
+                      </a:lnTo>
+                      <a:lnTo>
+                        <a:pt x="301290" y="23959"/>
+                      </a:lnTo>
+                      <a:close/>
+                    </a:path>
+                  </a:pathLst>
+                </a:custGeom>
+                <a:solidFill>
+                  <a:srgbClr val="FDEADA"/>
+                </a:solidFill>
+                <a:ln w="6000" cap="flat">
+                  <a:solidFill>
+                    <a:srgbClr val="7B4B23"/>
+                  </a:solidFill>
+                  <a:miter lim="800000"/>
+                </a:ln>
+              </p:spPr>
+              <p:txBody>
+                <a:bodyPr/>
+                <a:lstStyle/>
+                <a:p>
+                  <a:endParaRPr lang="en-US"/>
+                </a:p>
+              </p:txBody>
+            </p:sp>
+            <p:sp>
+              <p:nvSpPr>
+                <p:cNvPr id="21" name="Freeform 20"/>
+                <p:cNvSpPr/>
+                <p:nvPr/>
+              </p:nvSpPr>
+              <p:spPr>
+                <a:xfrm>
+                  <a:off x="119647" y="812499"/>
+                  <a:ext cx="69006" cy="35942"/>
+                </a:xfrm>
+                <a:custGeom>
+                  <a:avLst/>
+                  <a:gdLst/>
+                  <a:ahLst/>
+                  <a:cxnLst/>
+                  <a:rect l="0" t="0" r="0" b="0"/>
+                  <a:pathLst>
+                    <a:path w="69006" h="35942">
+                      <a:moveTo>
+                        <a:pt x="0" y="0"/>
+                      </a:moveTo>
+                      <a:cubicBezTo>
+                        <a:pt x="0" y="0"/>
+                        <a:pt x="13858" y="5248"/>
+                        <a:pt x="26288" y="9802"/>
+                      </a:cubicBezTo>
+                      <a:cubicBezTo>
+                        <a:pt x="41896" y="15520"/>
+                        <a:pt x="69006" y="28590"/>
+                        <a:pt x="69006" y="28590"/>
+                      </a:cubicBezTo>
+                      <a:cubicBezTo>
+                        <a:pt x="69006" y="28590"/>
+                        <a:pt x="42718" y="35942"/>
+                        <a:pt x="30395" y="35942"/>
+                      </a:cubicBezTo>
+                      <a:cubicBezTo>
+                        <a:pt x="18073" y="35942"/>
+                        <a:pt x="5750" y="31857"/>
+                        <a:pt x="5750" y="26140"/>
+                      </a:cubicBezTo>
+                      <a:cubicBezTo>
+                        <a:pt x="5750" y="20422"/>
+                        <a:pt x="8215" y="10619"/>
+                        <a:pt x="8215" y="10619"/>
+                      </a:cubicBezTo>
+                      <a:lnTo>
+                        <a:pt x="0" y="0"/>
+                      </a:lnTo>
+                      <a:close/>
+                    </a:path>
+                  </a:pathLst>
+                </a:custGeom>
+                <a:solidFill>
+                  <a:srgbClr val="262626"/>
+                </a:solidFill>
+                <a:ln w="6000" cap="flat">
+                  <a:noFill/>
+                  <a:miter lim="800000"/>
+                </a:ln>
+              </p:spPr>
+              <p:txBody>
+                <a:bodyPr/>
+                <a:lstStyle/>
+                <a:p>
+                  <a:endParaRPr lang="en-US"/>
+                </a:p>
+              </p:txBody>
+            </p:sp>
+            <p:sp>
+              <p:nvSpPr>
+                <p:cNvPr id="22" name="Freeform 21"/>
+                <p:cNvSpPr/>
+                <p:nvPr/>
+              </p:nvSpPr>
+              <p:spPr>
+                <a:xfrm flipH="1">
+                  <a:off x="41959" y="578399"/>
+                  <a:ext cx="420059" cy="428240"/>
+                </a:xfrm>
+                <a:custGeom>
+                  <a:avLst/>
+                  <a:gdLst/>
+                  <a:ahLst/>
+                  <a:cxnLst/>
+                  <a:rect l="0" t="0" r="0" b="0"/>
+                  <a:pathLst>
+                    <a:path w="420059" h="428240">
+                      <a:moveTo>
+                        <a:pt x="325940" y="100673"/>
+                      </a:moveTo>
+                      <a:cubicBezTo>
+                        <a:pt x="304991" y="102905"/>
+                        <a:pt x="239410" y="189983"/>
+                        <a:pt x="225170" y="203054"/>
+                      </a:cubicBezTo>
+                      <a:cubicBezTo>
+                        <a:pt x="210931" y="216123"/>
+                        <a:pt x="148498" y="222658"/>
+                        <a:pt x="123305" y="215035"/>
+                      </a:cubicBezTo>
+                      <a:cubicBezTo>
+                        <a:pt x="134258" y="227015"/>
+                        <a:pt x="199978" y="220478"/>
+                        <a:pt x="199978" y="220481"/>
+                      </a:cubicBezTo>
+                      <a:cubicBezTo>
+                        <a:pt x="199978" y="220478"/>
+                        <a:pt x="170261" y="231847"/>
+                        <a:pt x="163832" y="243352"/>
+                      </a:cubicBezTo>
+                      <a:cubicBezTo>
+                        <a:pt x="152878" y="262957"/>
+                        <a:pt x="172595" y="309790"/>
+                        <a:pt x="172594" y="309791"/>
+                      </a:cubicBezTo>
+                      <a:cubicBezTo>
+                        <a:pt x="172595" y="309790"/>
+                        <a:pt x="145864" y="280436"/>
+                        <a:pt x="139516" y="266251"/>
+                      </a:cubicBezTo>
+                      <a:cubicBezTo>
+                        <a:pt x="133165" y="252064"/>
+                        <a:pt x="114542" y="225926"/>
+                        <a:pt x="91666" y="227341"/>
+                      </a:cubicBezTo>
+                      <a:cubicBezTo>
+                        <a:pt x="78418" y="228162"/>
+                        <a:pt x="71949" y="249451"/>
+                        <a:pt x="71949" y="261104"/>
+                      </a:cubicBezTo>
+                      <a:cubicBezTo>
+                        <a:pt x="71949" y="272759"/>
+                        <a:pt x="86737" y="322643"/>
+                        <a:pt x="95921" y="340286"/>
+                      </a:cubicBezTo>
+                      <a:cubicBezTo>
+                        <a:pt x="105107" y="357929"/>
+                        <a:pt x="125497" y="365335"/>
+                        <a:pt x="125495" y="365337"/>
+                      </a:cubicBezTo>
+                      <a:cubicBezTo>
+                        <a:pt x="125497" y="365335"/>
+                        <a:pt x="136449" y="417616"/>
+                        <a:pt x="133288" y="421207"/>
+                      </a:cubicBezTo>
+                      <a:cubicBezTo>
+                        <a:pt x="128280" y="426904"/>
+                        <a:pt x="112601" y="428989"/>
+                        <a:pt x="105904" y="428240"/>
+                      </a:cubicBezTo>
+                      <a:cubicBezTo>
+                        <a:pt x="99209" y="428240"/>
+                        <a:pt x="44991" y="406180"/>
+                        <a:pt x="47732" y="392566"/>
+                      </a:cubicBezTo>
+                      <a:cubicBezTo>
+                        <a:pt x="50467" y="378949"/>
+                        <a:pt x="26916" y="318504"/>
+                        <a:pt x="7201" y="267314"/>
+                      </a:cubicBezTo>
+                      <a:cubicBezTo>
+                        <a:pt x="-1175" y="245570"/>
+                        <a:pt x="-2655" y="187806"/>
+                        <a:pt x="5136" y="148594"/>
+                      </a:cubicBezTo>
+                      <a:cubicBezTo>
+                        <a:pt x="12678" y="109386"/>
+                        <a:pt x="45537" y="22254"/>
+                        <a:pt x="114542" y="5154"/>
+                      </a:cubicBezTo>
+                      <a:cubicBezTo>
+                        <a:pt x="183548" y="-12599"/>
+                        <a:pt x="327727" y="18720"/>
+                        <a:pt x="341276" y="27699"/>
+                      </a:cubicBezTo>
+                      <a:cubicBezTo>
+                        <a:pt x="351133" y="34236"/>
+                        <a:pt x="369754" y="91960"/>
+                        <a:pt x="356610" y="87604"/>
+                      </a:cubicBezTo>
+                      <a:cubicBezTo>
+                        <a:pt x="373040" y="74534"/>
+                        <a:pt x="355514" y="40770"/>
+                        <a:pt x="355514" y="40771"/>
+                      </a:cubicBezTo>
+                      <a:cubicBezTo>
+                        <a:pt x="355514" y="40770"/>
+                        <a:pt x="375529" y="43806"/>
+                        <a:pt x="396041" y="77802"/>
+                      </a:cubicBezTo>
+                      <a:cubicBezTo>
+                        <a:pt x="405900" y="94139"/>
+                        <a:pt x="435475" y="175826"/>
+                        <a:pt x="410282" y="211767"/>
+                      </a:cubicBezTo>
+                      <a:cubicBezTo>
+                        <a:pt x="400423" y="97407"/>
+                        <a:pt x="359623" y="110318"/>
+                        <a:pt x="359623" y="110318"/>
+                      </a:cubicBezTo>
+                      <a:cubicBezTo>
+                        <a:pt x="359623" y="110318"/>
+                        <a:pt x="356610" y="97407"/>
+                        <a:pt x="325940" y="100673"/>
+                      </a:cubicBezTo>
+                      <a:close/>
+                    </a:path>
+                  </a:pathLst>
+                </a:custGeom>
+                <a:solidFill>
+                  <a:srgbClr val="002060"/>
+                </a:solidFill>
+                <a:ln w="6000" cap="flat">
+                  <a:noFill/>
+                  <a:miter lim="800000"/>
+                </a:ln>
+              </p:spPr>
+              <p:txBody>
+                <a:bodyPr/>
+                <a:lstStyle/>
+                <a:p>
+                  <a:endParaRPr lang="en-US"/>
+                </a:p>
+              </p:txBody>
+            </p:sp>
+            <p:sp>
+              <p:nvSpPr>
+                <p:cNvPr id="23" name="Freeform 22"/>
+                <p:cNvSpPr/>
+                <p:nvPr/>
+              </p:nvSpPr>
+              <p:spPr>
+                <a:xfrm>
+                  <a:off x="100204" y="783099"/>
+                  <a:ext cx="119837" cy="47923"/>
+                </a:xfrm>
+                <a:custGeom>
+                  <a:avLst/>
+                  <a:gdLst/>
+                  <a:ahLst/>
+                  <a:cxnLst/>
+                  <a:rect l="0" t="0" r="0" b="0"/>
+                  <a:pathLst>
+                    <a:path w="119837" h="47923">
+                      <a:moveTo>
+                        <a:pt x="-297" y="0"/>
+                      </a:moveTo>
+                      <a:cubicBezTo>
+                        <a:pt x="-297" y="0"/>
+                        <a:pt x="1501" y="8979"/>
+                        <a:pt x="8691" y="11429"/>
+                      </a:cubicBezTo>
+                      <a:cubicBezTo>
+                        <a:pt x="15881" y="13881"/>
+                        <a:pt x="65614" y="19049"/>
+                        <a:pt x="79994" y="24495"/>
+                      </a:cubicBezTo>
+                      <a:cubicBezTo>
+                        <a:pt x="95932" y="30530"/>
+                        <a:pt x="119540" y="48456"/>
+                        <a:pt x="119540" y="48456"/>
+                      </a:cubicBezTo>
+                      <a:cubicBezTo>
+                        <a:pt x="119540" y="48456"/>
+                        <a:pt x="102635" y="24420"/>
+                        <a:pt x="85987" y="14692"/>
+                      </a:cubicBezTo>
+                      <a:cubicBezTo>
+                        <a:pt x="69209" y="4890"/>
+                        <a:pt x="-297" y="0"/>
+                        <a:pt x="-297" y="0"/>
+                      </a:cubicBezTo>
+                      <a:close/>
+                    </a:path>
+                  </a:pathLst>
+                </a:custGeom>
+                <a:solidFill>
+                  <a:srgbClr val="262626"/>
+                </a:solidFill>
+                <a:ln w="6000" cap="flat">
+                  <a:noFill/>
+                  <a:miter lim="800000"/>
+                </a:ln>
+              </p:spPr>
+              <p:txBody>
+                <a:bodyPr/>
+                <a:lstStyle/>
+                <a:p>
+                  <a:endParaRPr lang="en-US"/>
+                </a:p>
+              </p:txBody>
+            </p:sp>
+            <p:sp>
+              <p:nvSpPr>
+                <p:cNvPr id="24" name="Freeform 23"/>
+                <p:cNvSpPr/>
+                <p:nvPr/>
+              </p:nvSpPr>
+              <p:spPr>
+                <a:xfrm flipH="1">
+                  <a:off x="113734" y="1017262"/>
+                  <a:ext cx="317403" cy="160710"/>
+                </a:xfrm>
+                <a:custGeom>
+                  <a:avLst/>
+                  <a:gdLst/>
+                  <a:ahLst/>
+                  <a:cxnLst/>
+                  <a:rect l="0" t="0" r="0" b="0"/>
+                  <a:pathLst>
+                    <a:path w="317403" h="160710">
+                      <a:moveTo>
+                        <a:pt x="690" y="36753"/>
+                      </a:moveTo>
+                      <a:cubicBezTo>
+                        <a:pt x="690" y="36753"/>
+                        <a:pt x="34556" y="0"/>
+                        <a:pt x="55944" y="0"/>
+                      </a:cubicBezTo>
+                      <a:cubicBezTo>
+                        <a:pt x="77332" y="0"/>
+                        <a:pt x="152008" y="43895"/>
+                        <a:pt x="152008" y="43895"/>
+                      </a:cubicBezTo>
+                      <a:cubicBezTo>
+                        <a:pt x="152008" y="43895"/>
+                        <a:pt x="213517" y="94883"/>
+                        <a:pt x="242076" y="98755"/>
+                      </a:cubicBezTo>
+                      <a:cubicBezTo>
+                        <a:pt x="268040" y="81974"/>
+                        <a:pt x="250670" y="18077"/>
+                        <a:pt x="250670" y="18077"/>
+                      </a:cubicBezTo>
+                      <a:cubicBezTo>
+                        <a:pt x="250670" y="18077"/>
+                        <a:pt x="319441" y="80045"/>
+                        <a:pt x="316843" y="134260"/>
+                      </a:cubicBezTo>
+                      <a:cubicBezTo>
+                        <a:pt x="290882" y="100699"/>
+                        <a:pt x="247002" y="109347"/>
+                        <a:pt x="247002" y="109347"/>
+                      </a:cubicBezTo>
+                      <a:lnTo>
+                        <a:pt x="180536" y="161369"/>
+                      </a:lnTo>
+                      <a:cubicBezTo>
+                        <a:pt x="180536" y="161361"/>
+                        <a:pt x="92270" y="60663"/>
+                        <a:pt x="59664" y="51627"/>
+                      </a:cubicBezTo>
+                      <a:cubicBezTo>
+                        <a:pt x="27059" y="42591"/>
+                        <a:pt x="691" y="36753"/>
+                        <a:pt x="690" y="36753"/>
+                      </a:cubicBezTo>
+                      <a:close/>
+                    </a:path>
+                  </a:pathLst>
+                </a:custGeom>
+                <a:gradFill>
+                  <a:gsLst>
+                    <a:gs pos="0">
+                      <a:srgbClr val="DCE6F2"/>
+                    </a:gs>
+                    <a:gs pos="50000">
+                      <a:srgbClr val="B9CDE5"/>
+                    </a:gs>
+                    <a:gs pos="100000">
+                      <a:srgbClr val="95B3D7"/>
+                    </a:gs>
+                  </a:gsLst>
+                  <a:lin ang="5400000" scaled="0"/>
+                </a:gradFill>
+                <a:ln w="6000" cap="flat">
+                  <a:solidFill>
+                    <a:srgbClr val="366092"/>
+                  </a:solidFill>
+                  <a:bevel/>
+                </a:ln>
+              </p:spPr>
+              <p:txBody>
+                <a:bodyPr/>
+                <a:lstStyle/>
+                <a:p>
+                  <a:endParaRPr lang="en-US"/>
+                </a:p>
+              </p:txBody>
+            </p:sp>
+            <p:sp>
+              <p:nvSpPr>
+                <p:cNvPr id="25" name="Text 162"/>
+                <p:cNvSpPr txBox="1"/>
+                <p:nvPr/>
+              </p:nvSpPr>
+              <p:spPr>
+                <a:xfrm>
+                  <a:off x="-3000" y="1208625"/>
+                  <a:ext cx="510000" cy="120000"/>
+                </a:xfrm>
+                <a:prstGeom prst="rect">
+                  <a:avLst/>
+                </a:prstGeom>
+                <a:noFill/>
+              </p:spPr>
+              <p:txBody>
+                <a:bodyPr wrap="square" lIns="36000" tIns="0" rIns="36000" bIns="0" rtlCol="0" anchor="ctr"/>
+                <a:lstStyle/>
+                <a:p>
+                  <a:pPr marL="0" marR="0" algn="ctr">
+                    <a:spcBef>
+                      <a:spcPts val="0"/>
+                    </a:spcBef>
+                    <a:spcAft>
+                      <a:spcPts val="0"/>
+                    </a:spcAft>
+                  </a:pPr>
+                  <a:r>
+                    <a:rPr lang="en-US" sz="850" kern="100">
+                      <a:solidFill>
+                        <a:srgbClr val="303030"/>
+                      </a:solidFill>
+                      <a:effectLst/>
+                      <a:latin typeface="Arial" panose="020B0604020202020204" pitchFamily="34" charset="0"/>
+                      <a:ea typeface="SimSun" panose="02010600030101010101" pitchFamily="2" charset="-122"/>
+                      <a:cs typeface="Times New Roman" panose="02020603050405020304" pitchFamily="18" charset="0"/>
+                    </a:rPr>
+                    <a:t>End user</a:t>
+                  </a:r>
+                  <a:endParaRPr lang="en-US" sz="1050" kern="100">
+                    <a:effectLst/>
+                    <a:latin typeface="Calibri" panose="020F0502020204030204" pitchFamily="34" charset="0"/>
+                    <a:ea typeface="SimSun" panose="02010600030101010101" pitchFamily="2" charset="-122"/>
+                    <a:cs typeface="Times New Roman" panose="02020603050405020304" pitchFamily="18" charset="0"/>
+                  </a:endParaRPr>
+                </a:p>
+              </p:txBody>
+            </p:sp>
+          </p:grpSp>
+          <p:pic>
+            <p:nvPicPr>
+              <p:cNvPr id="13" name="Picture 12"/>
+              <p:cNvPicPr/>
+              <p:nvPr/>
+            </p:nvPicPr>
+            <p:blipFill>
+              <a:blip r:embed="rId2" cstate="print">
+                <a:extLst>
+                  <a:ext uri="{28A0092B-C50C-407E-A947-70E740481C1C}">
+                    <a14:useLocalDpi xmlns:a14="http://schemas.microsoft.com/office/drawing/2010/main" val="0"/>
+                  </a:ext>
+                </a:extLst>
+              </a:blip>
+              <a:stretch>
+                <a:fillRect/>
+              </a:stretch>
+            </p:blipFill>
+            <p:spPr>
+              <a:xfrm>
+                <a:off x="5064000" y="1172625"/>
+                <a:ext cx="870000" cy="840000"/>
+              </a:xfrm>
+              <a:prstGeom prst="rect">
+                <a:avLst/>
+              </a:prstGeom>
+            </p:spPr>
+          </p:pic>
+          <p:sp>
+            <p:nvSpPr>
+              <p:cNvPr id="14" name="ConnectLine"/>
+              <p:cNvSpPr/>
+              <p:nvPr/>
+            </p:nvSpPr>
+            <p:spPr>
+              <a:xfrm>
+                <a:off x="2333999" y="1172625"/>
+                <a:ext cx="912000" cy="534001"/>
+              </a:xfrm>
+              <a:custGeom>
+                <a:avLst/>
+                <a:gdLst/>
+                <a:ahLst/>
+                <a:cxnLst/>
+                <a:rect l="0" t="0" r="0" b="0"/>
+                <a:pathLst>
+                  <a:path w="912000" h="534001" fill="none">
+                    <a:moveTo>
+                      <a:pt x="0" y="0"/>
+                    </a:moveTo>
+                    <a:lnTo>
+                      <a:pt x="720000" y="0"/>
+                    </a:lnTo>
+                    <a:lnTo>
+                      <a:pt x="720000" y="-534001"/>
+                    </a:lnTo>
+                    <a:lnTo>
+                      <a:pt x="912000" y="-534001"/>
+                    </a:lnTo>
+                  </a:path>
+                </a:pathLst>
+              </a:custGeom>
+              <a:noFill/>
+              <a:ln w="12000" cap="flat">
+                <a:solidFill>
+                  <a:srgbClr val="6D6D6D"/>
+                </a:solidFill>
+                <a:bevel/>
+                <a:headEnd type="triangle" w="med" len="med"/>
+                <a:tailEnd type="triangle" w="med" len="med"/>
+              </a:ln>
+            </p:spPr>
+            <p:txBody>
+              <a:bodyPr/>
+              <a:lstStyle/>
+              <a:p>
+                <a:endParaRPr lang="en-US"/>
+              </a:p>
+            </p:txBody>
+          </p:sp>
+          <p:sp>
+            <p:nvSpPr>
+              <p:cNvPr id="15" name="ConnectLine"/>
+              <p:cNvSpPr/>
+              <p:nvPr/>
+            </p:nvSpPr>
+            <p:spPr>
+              <a:xfrm>
+                <a:off x="471965" y="1107594"/>
+                <a:ext cx="827438" cy="54000"/>
+              </a:xfrm>
+              <a:custGeom>
+                <a:avLst/>
+                <a:gdLst/>
+                <a:ahLst/>
+                <a:cxnLst/>
+                <a:rect l="0" t="0" r="0" b="0"/>
+                <a:pathLst>
+                  <a:path w="743688" h="54000" fill="none">
+                    <a:moveTo>
+                      <a:pt x="0" y="0"/>
+                    </a:moveTo>
+                    <a:lnTo>
+                      <a:pt x="743688" y="0"/>
+                    </a:lnTo>
+                  </a:path>
+                </a:pathLst>
+              </a:custGeom>
+              <a:noFill/>
+              <a:ln w="12000" cap="flat">
+                <a:solidFill>
+                  <a:srgbClr val="6D6D6D"/>
+                </a:solidFill>
+                <a:bevel/>
+                <a:headEnd type="triangle" w="med" len="med"/>
+                <a:tailEnd type="triangle" w="med" len="med"/>
+              </a:ln>
+            </p:spPr>
+            <p:txBody>
+              <a:bodyPr/>
+              <a:lstStyle/>
+              <a:p>
+                <a:endParaRPr lang="en-US"/>
+              </a:p>
+            </p:txBody>
+          </p:sp>
+          <p:sp>
+            <p:nvSpPr>
+              <p:cNvPr id="16" name="ConnectLine"/>
+              <p:cNvSpPr/>
+              <p:nvPr/>
+            </p:nvSpPr>
+            <p:spPr>
+              <a:xfrm>
+                <a:off x="2334000" y="1172625"/>
+                <a:ext cx="0" cy="0"/>
+              </a:xfrm>
+              <a:custGeom>
+                <a:avLst/>
+                <a:gdLst/>
+                <a:ahLst/>
+                <a:cxnLst/>
+                <a:rect l="0" t="0" r="0" b="0"/>
+                <a:pathLst>
+                  <a:path fill="none">
+                    <a:moveTo>
+                      <a:pt x="0" y="0"/>
+                    </a:moveTo>
+                    <a:lnTo>
+                      <a:pt x="0" y="0"/>
+                    </a:lnTo>
+                  </a:path>
+                </a:pathLst>
+              </a:custGeom>
+              <a:noFill/>
+              <a:ln w="12000" cap="flat">
+                <a:solidFill>
+                  <a:srgbClr val="6D6D6D"/>
+                </a:solidFill>
+                <a:bevel/>
+                <a:tailEnd type="stealth" w="med" len="med"/>
+              </a:ln>
+            </p:spPr>
+            <p:txBody>
+              <a:bodyPr/>
+              <a:lstStyle/>
+              <a:p>
+                <a:endParaRPr lang="en-US"/>
+              </a:p>
+            </p:txBody>
+          </p:sp>
+          <p:sp>
+            <p:nvSpPr>
+              <p:cNvPr id="17" name="ConnectLine"/>
+              <p:cNvSpPr/>
+              <p:nvPr/>
+            </p:nvSpPr>
+            <p:spPr>
+              <a:xfrm>
+                <a:off x="5064000" y="1592625"/>
+                <a:ext cx="1098000" cy="762000"/>
+              </a:xfrm>
+              <a:custGeom>
+                <a:avLst/>
+                <a:gdLst/>
+                <a:ahLst/>
+                <a:cxnLst/>
+                <a:rect l="0" t="0" r="0" b="0"/>
+                <a:pathLst>
+                  <a:path w="1098000" h="762000" fill="none">
+                    <a:moveTo>
+                      <a:pt x="0" y="0"/>
+                    </a:moveTo>
+                    <a:lnTo>
+                      <a:pt x="-274500" y="0"/>
+                    </a:lnTo>
+                    <a:lnTo>
+                      <a:pt x="-274500" y="-762000"/>
+                    </a:lnTo>
+                    <a:lnTo>
+                      <a:pt x="-1098000" y="-762000"/>
+                    </a:lnTo>
+                  </a:path>
+                </a:pathLst>
+              </a:custGeom>
+              <a:noFill/>
+              <a:ln w="12000" cap="flat">
+                <a:solidFill>
+                  <a:srgbClr val="6D6D6D"/>
+                </a:solidFill>
+                <a:bevel/>
+                <a:tailEnd type="triangle" w="med" len="med"/>
+              </a:ln>
+            </p:spPr>
+            <p:txBody>
+              <a:bodyPr/>
+              <a:lstStyle/>
+              <a:p>
+                <a:endParaRPr lang="en-US"/>
+              </a:p>
+            </p:txBody>
+          </p:sp>
+          <p:sp>
+            <p:nvSpPr>
+              <p:cNvPr id="18" name="ConnectLine"/>
+              <p:cNvSpPr/>
+              <p:nvPr/>
+            </p:nvSpPr>
+            <p:spPr>
+              <a:xfrm>
+                <a:off x="1793843" y="2318625"/>
+                <a:ext cx="539843" cy="840000"/>
+              </a:xfrm>
+              <a:custGeom>
+                <a:avLst/>
+                <a:gdLst/>
+                <a:ahLst/>
+                <a:cxnLst/>
+                <a:rect l="0" t="0" r="0" b="0"/>
+                <a:pathLst>
+                  <a:path w="539843" h="840000" fill="none">
+                    <a:moveTo>
+                      <a:pt x="0" y="0"/>
+                    </a:moveTo>
+                    <a:lnTo>
+                      <a:pt x="0" y="431999"/>
+                    </a:lnTo>
+                    <a:lnTo>
+                      <a:pt x="-539843" y="431999"/>
+                    </a:lnTo>
+                    <a:lnTo>
+                      <a:pt x="-539843" y="840000"/>
+                    </a:lnTo>
+                  </a:path>
+                </a:pathLst>
+              </a:custGeom>
+              <a:noFill/>
+              <a:ln w="12000" cap="flat">
+                <a:solidFill>
+                  <a:srgbClr val="6D6D6D"/>
+                </a:solidFill>
+                <a:bevel/>
+                <a:tailEnd type="triangle" w="med" len="med"/>
+              </a:ln>
+            </p:spPr>
+            <p:txBody>
+              <a:bodyPr/>
+              <a:lstStyle/>
+              <a:p>
+                <a:endParaRPr lang="en-US"/>
+              </a:p>
+            </p:txBody>
+          </p:sp>
+          <p:sp>
+            <p:nvSpPr>
+              <p:cNvPr id="19" name="ConnectLine"/>
+              <p:cNvSpPr/>
+              <p:nvPr/>
+            </p:nvSpPr>
+            <p:spPr>
+              <a:xfrm>
+                <a:off x="3629365" y="2126004"/>
+                <a:ext cx="191366" cy="960000"/>
+              </a:xfrm>
+              <a:custGeom>
+                <a:avLst/>
+                <a:gdLst/>
+                <a:ahLst/>
+                <a:cxnLst/>
+                <a:rect l="0" t="0" r="0" b="0"/>
+                <a:pathLst>
+                  <a:path w="191366" h="960000" fill="none">
+                    <a:moveTo>
+                      <a:pt x="0" y="0"/>
+                    </a:moveTo>
+                    <a:lnTo>
+                      <a:pt x="0" y="-384000"/>
+                    </a:lnTo>
+                    <a:lnTo>
+                      <a:pt x="-191366" y="-384000"/>
+                    </a:lnTo>
+                    <a:lnTo>
+                      <a:pt x="-191366" y="-960000"/>
+                    </a:lnTo>
+                  </a:path>
+                </a:pathLst>
+              </a:custGeom>
+              <a:noFill/>
+              <a:ln w="12000" cap="flat">
+                <a:solidFill>
+                  <a:srgbClr val="6D6D6D"/>
+                </a:solidFill>
+                <a:bevel/>
+                <a:tailEnd type="triangle" w="med" len="med"/>
+              </a:ln>
+            </p:spPr>
+            <p:txBody>
+              <a:bodyPr/>
+              <a:lstStyle/>
+              <a:p>
+                <a:endParaRPr lang="en-US"/>
+              </a:p>
+            </p:txBody>
+          </p:sp>
+        </p:grpSp>
+        <p:pic>
+          <p:nvPicPr>
+            <p:cNvPr id="8" name="Picture 7"/>
+            <p:cNvPicPr>
+              <a:picLocks noChangeAspect="1"/>
+            </p:cNvPicPr>
+            <p:nvPr/>
+          </p:nvPicPr>
+          <p:blipFill>
+            <a:blip r:embed="rId3">
+              <a:extLst>
+                <a:ext uri="{28A0092B-C50C-407E-A947-70E740481C1C}">
+                  <a14:useLocalDpi xmlns:a14="http://schemas.microsoft.com/office/drawing/2010/main" val="0"/>
+                </a:ext>
+              </a:extLst>
+            </a:blip>
+            <a:srcRect/>
+            <a:stretch>
+              <a:fillRect/>
+            </a:stretch>
+          </p:blipFill>
+          <p:spPr bwMode="auto">
+            <a:xfrm>
+              <a:off x="1257300" y="152400"/>
+              <a:ext cx="1043305" cy="2160270"/>
+            </a:xfrm>
+            <a:prstGeom prst="rect">
+              <a:avLst/>
+            </a:prstGeom>
+            <a:noFill/>
+            <a:ln>
+              <a:noFill/>
+            </a:ln>
+          </p:spPr>
+        </p:pic>
+      </p:grpSp>
+      <p:sp>
+        <p:nvSpPr>
+          <p:cNvPr id="45" name="Rectangle 44"/>
+          <p:cNvSpPr>
+            <a:spLocks noChangeArrowheads="1"/>
+          </p:cNvSpPr>
+          <p:nvPr/>
+        </p:nvSpPr>
+        <p:spPr bwMode="auto">
+          <a:xfrm>
+            <a:off x="904875" y="1653235"/>
+            <a:ext cx="9144000" cy="457200"/>
+          </a:xfrm>
+          <a:prstGeom prst="rect">
+            <a:avLst/>
+          </a:prstGeom>
+          <a:noFill/>
+          <a:ln>
+            <a:noFill/>
+          </a:ln>
+          <a:effectLst/>
+          <a:extLst>
+            <a:ext uri="{909E8E84-426E-40DD-AFC4-6F175D3DCCD1}">
+              <a14:hiddenFill xmlns:a14="http://schemas.microsoft.com/office/drawing/2010/main">
+                <a:solidFill>
+                  <a:schemeClr val="accent1"/>
+                </a:solidFill>
+              </a14:hiddenFill>
+            </a:ext>
+            <a:ext uri="{91240B29-F687-4F45-9708-019B960494DF}">
+              <a14:hiddenLine xmlns:a14="http://schemas.microsoft.com/office/drawing/2010/main" w="9525">
+                <a:solidFill>
+                  <a:schemeClr val="tx1"/>
+                </a:solidFill>
+                <a:miter lim="800000"/>
+                <a:headEnd/>
+                <a:tailEnd/>
+              </a14:hiddenLine>
+            </a:ext>
+            <a:ext uri="{AF507438-7753-43E0-B8FC-AC1667EBCBE1}">
+              <a14:hiddenEffects xmlns:a14="http://schemas.microsoft.com/office/drawing/2010/main">
+                <a:effectLst>
+                  <a:outerShdw dist="35921" dir="2700000" algn="ctr" rotWithShape="0">
+                    <a:schemeClr val="bg2"/>
+                  </a:outerShdw>
+                </a:effectLst>
+              </a14:hiddenEffects>
+            </a:ext>
+          </a:extLst>
+        </p:spPr>
+        <p:txBody>
+          <a:bodyPr vert="horz" wrap="none" lIns="91440" tIns="45720" rIns="91440" bIns="45720" numCol="1" anchor="ctr" anchorCtr="0" compatLnSpc="1">
+            <a:prstTxWarp prst="textNoShape">
+              <a:avLst/>
+            </a:prstTxWarp>
+            <a:spAutoFit/>
+          </a:bodyPr>
+          <a:lstStyle/>
+          <a:p>
+            <a:pPr marL="0" marR="0" lvl="0" indent="0" algn="l" defTabSz="914400" rtl="0" eaLnBrk="0" fontAlgn="base" latinLnBrk="0" hangingPunct="0">
+              <a:lnSpc>
+                <a:spcPct val="100000"/>
+              </a:lnSpc>
+              <a:spcBef>
+                <a:spcPct val="0"/>
+              </a:spcBef>
+              <a:spcAft>
+                <a:spcPct val="0"/>
+              </a:spcAft>
+              <a:buClrTx/>
+              <a:buSzTx/>
+              <a:buFontTx/>
+              <a:buNone/>
+              <a:tabLst/>
+            </a:pPr>
+            <a:endParaRPr kumimoji="0" lang="en-US" altLang="en-US" sz="800" b="0" i="0" u="none" strike="noStrike" cap="none" normalizeH="0" baseline="0" smtClean="0">
+              <a:ln>
+                <a:noFill/>
+              </a:ln>
+              <a:solidFill>
+                <a:schemeClr val="tx1"/>
+              </a:solidFill>
+              <a:effectLst/>
+            </a:endParaRPr>
+          </a:p>
+          <a:p>
+            <a:pPr marL="0" marR="0" lvl="0" indent="0" algn="l" defTabSz="914400" rtl="0" eaLnBrk="0" fontAlgn="base" latinLnBrk="0" hangingPunct="0">
+              <a:lnSpc>
+                <a:spcPct val="100000"/>
+              </a:lnSpc>
+              <a:spcBef>
+                <a:spcPct val="0"/>
+              </a:spcBef>
+              <a:spcAft>
+                <a:spcPct val="0"/>
+              </a:spcAft>
+              <a:buClrTx/>
+              <a:buSzTx/>
+              <a:buFontTx/>
+              <a:buNone/>
+              <a:tabLst/>
+            </a:pPr>
+            <a:r>
+              <a:rPr kumimoji="0" lang="en-US" altLang="en-US" sz="1800" b="0" i="0" u="none" strike="noStrike" cap="none" normalizeH="0" baseline="0" smtClean="0">
+                <a:ln>
+                  <a:noFill/>
+                </a:ln>
+                <a:solidFill>
+                  <a:schemeClr val="tx1"/>
+                </a:solidFill>
+                <a:effectLst/>
+                <a:latin typeface="Arial" panose="020B0604020202020204" pitchFamily="34" charset="0"/>
+              </a:rPr>
+              <a:t/>
+            </a:r>
+            <a:br>
+              <a:rPr kumimoji="0" lang="en-US" altLang="en-US" sz="1800" b="0" i="0" u="none" strike="noStrike" cap="none" normalizeH="0" baseline="0" smtClean="0">
+                <a:ln>
+                  <a:noFill/>
+                </a:ln>
+                <a:solidFill>
+                  <a:schemeClr val="tx1"/>
+                </a:solidFill>
+                <a:effectLst/>
+                <a:latin typeface="Arial" panose="020B0604020202020204" pitchFamily="34" charset="0"/>
+              </a:rPr>
+            </a:br>
+            <a:endParaRPr kumimoji="0" lang="en-US" altLang="en-US" sz="1800" b="0" i="0" u="none" strike="noStrike" cap="none" normalizeH="0" baseline="0" smtClean="0">
+              <a:ln>
+                <a:noFill/>
+              </a:ln>
+              <a:solidFill>
+                <a:schemeClr val="tx1"/>
+              </a:solidFill>
+              <a:effectLst/>
+              <a:latin typeface="Arial" panose="020B0604020202020204" pitchFamily="34" charset="0"/>
+            </a:endParaRPr>
+          </a:p>
+          <a:p>
+            <a:pPr marL="0" marR="0" lvl="0" indent="0" algn="l" defTabSz="914400" rtl="0" eaLnBrk="0" fontAlgn="base" latinLnBrk="0" hangingPunct="0">
+              <a:lnSpc>
+                <a:spcPct val="100000"/>
+              </a:lnSpc>
+              <a:spcBef>
+                <a:spcPct val="0"/>
+              </a:spcBef>
+              <a:spcAft>
+                <a:spcPct val="0"/>
+              </a:spcAft>
+              <a:buClrTx/>
+              <a:buSzTx/>
+              <a:buFontTx/>
+              <a:buNone/>
+              <a:tabLst/>
+            </a:pPr>
+            <a:endParaRPr kumimoji="0" lang="en-US" altLang="en-US" sz="1800" b="0" i="0" u="none" strike="noStrike" cap="none" normalizeH="0" baseline="0" smtClean="0">
+              <a:ln>
+                <a:noFill/>
+              </a:ln>
+              <a:solidFill>
+                <a:schemeClr val="tx1"/>
+              </a:solidFill>
+              <a:effectLst/>
+              <a:latin typeface="Arial" panose="020B0604020202020204" pitchFamily="34" charset="0"/>
+            </a:endParaRPr>
+          </a:p>
+        </p:txBody>
+      </p:sp>
+    </p:spTree>
+    <p:extLst>
+      <p:ext uri="{BB962C8B-B14F-4D97-AF65-F5344CB8AC3E}">
+        <p14:creationId xmlns:p14="http://schemas.microsoft.com/office/powerpoint/2010/main" val="729382107"/>
+      </p:ext>
+    </p:extLst>
+  </p:cSld>
+  <p:clrMapOvr>
+    <a:masterClrMapping/>
+  </p:clrMapOvr>
+</p:sld>
+</file>
+
 <file path=ppt/theme/theme1.xml><?xml version="1.0" encoding="utf-8"?>
 <a:theme xmlns:a="http://schemas.openxmlformats.org/drawingml/2006/main" name="Infusion">
   <a:themeElements>

</xml_diff>